<commit_message>
Update slides and setup instructions.
</commit_message>
<xml_diff>
--- a/intro_python_programming.pptx
+++ b/intro_python_programming.pptx
@@ -2,7 +2,7 @@
 <file path=ppt/presentation.xml><?xml version="1.0" encoding="utf-8"?>
 <p:presentation xmlns:a="http://schemas.openxmlformats.org/drawingml/2006/main" xmlns:r="http://schemas.openxmlformats.org/officeDocument/2006/relationships" xmlns:p="http://schemas.openxmlformats.org/presentationml/2006/main" showSpecialPlsOnTitleSld="0" saveSubsetFonts="1" autoCompressPictures="0">
   <p:sldMasterIdLst>
-    <p:sldMasterId id="2147483660" r:id="rId1"/>
+    <p:sldMasterId id="2147483881" r:id="rId1"/>
   </p:sldMasterIdLst>
   <p:notesMasterIdLst>
     <p:notesMasterId r:id="rId4"/>
@@ -562,6 +562,36 @@
           <a:chExt cx="0" cy="0"/>
         </a:xfrm>
       </p:grpSpPr>
+      <p:pic>
+        <p:nvPicPr>
+          <p:cNvPr id="7" name="Picture 6" descr="C0-HD-BTM.png"/>
+          <p:cNvPicPr>
+            <a:picLocks noChangeAspect="1"/>
+          </p:cNvPicPr>
+          <p:nvPr/>
+        </p:nvPicPr>
+        <p:blipFill>
+          <a:blip r:embed="rId2">
+            <a:extLst>
+              <a:ext uri="{28A0092B-C50C-407E-A947-70E740481C1C}">
+                <a14:useLocalDpi xmlns:a14="http://schemas.microsoft.com/office/drawing/2010/main" val="0"/>
+              </a:ext>
+            </a:extLst>
+          </a:blip>
+          <a:stretch>
+            <a:fillRect/>
+          </a:stretch>
+        </p:blipFill>
+        <p:spPr>
+          <a:xfrm>
+            <a:off x="0" y="4995862"/>
+            <a:ext cx="9144000" cy="1862138"/>
+          </a:xfrm>
+          <a:prstGeom prst="rect">
+            <a:avLst/>
+          </a:prstGeom>
+        </p:spPr>
+      </p:pic>
       <p:sp>
         <p:nvSpPr>
           <p:cNvPr id="2" name="Title 1"/>
@@ -574,14 +604,16 @@
         </p:nvSpPr>
         <p:spPr>
           <a:xfrm>
-            <a:off x="685800" y="1122363"/>
-            <a:ext cx="7772400" cy="2387600"/>
-          </a:xfrm>
-        </p:spPr>
-        <p:txBody>
-          <a:bodyPr anchor="b"/>
+            <a:off x="914400" y="1803405"/>
+            <a:ext cx="7315200" cy="1825096"/>
+          </a:xfrm>
+        </p:spPr>
+        <p:txBody>
+          <a:bodyPr anchor="b">
+            <a:normAutofit/>
+          </a:bodyPr>
           <a:lstStyle>
-            <a:lvl1pPr algn="ctr">
+            <a:lvl1pPr algn="l">
               <a:defRPr sz="6000"/>
             </a:lvl1pPr>
           </a:lstStyle>
@@ -606,16 +638,18 @@
         </p:nvSpPr>
         <p:spPr>
           <a:xfrm>
-            <a:off x="1143000" y="3602038"/>
-            <a:ext cx="6858000" cy="1655762"/>
-          </a:xfrm>
-        </p:spPr>
-        <p:txBody>
-          <a:bodyPr/>
+            <a:off x="914400" y="3632201"/>
+            <a:ext cx="7315200" cy="685800"/>
+          </a:xfrm>
+        </p:spPr>
+        <p:txBody>
+          <a:bodyPr>
+            <a:normAutofit/>
+          </a:bodyPr>
           <a:lstStyle>
-            <a:lvl1pPr marL="0" indent="0" algn="ctr">
-              <a:buNone/>
-              <a:defRPr sz="2400"/>
+            <a:lvl1pPr marL="0" indent="0" algn="l">
+              <a:buNone/>
+              <a:defRPr sz="2000"/>
             </a:lvl1pPr>
             <a:lvl2pPr marL="457200" indent="0" algn="ctr">
               <a:buNone/>
@@ -669,7 +703,12 @@
             <p:ph type="dt" sz="half" idx="10"/>
           </p:nvPr>
         </p:nvSpPr>
-        <p:spPr/>
+        <p:spPr>
+          <a:xfrm>
+            <a:off x="5932170" y="4323845"/>
+            <a:ext cx="2297429" cy="365125"/>
+          </a:xfrm>
+        </p:spPr>
         <p:txBody>
           <a:bodyPr/>
           <a:lstStyle/>
@@ -692,7 +731,12 @@
             <p:ph type="ftr" sz="quarter" idx="11"/>
           </p:nvPr>
         </p:nvSpPr>
-        <p:spPr/>
+        <p:spPr>
+          <a:xfrm>
+            <a:off x="914400" y="4323846"/>
+            <a:ext cx="4880610" cy="365125"/>
+          </a:xfrm>
+        </p:spPr>
         <p:txBody>
           <a:bodyPr/>
           <a:lstStyle/>
@@ -711,7 +755,12 @@
             <p:ph type="sldNum" sz="quarter" idx="12"/>
           </p:nvPr>
         </p:nvSpPr>
-        <p:spPr/>
+        <p:spPr>
+          <a:xfrm>
+            <a:off x="6057900" y="1430867"/>
+            <a:ext cx="2171700" cy="365125"/>
+          </a:xfrm>
+        </p:spPr>
         <p:txBody>
           <a:bodyPr/>
           <a:lstStyle/>
@@ -733,6 +782,2574 @@
 </file>
 
 <file path=ppt/slideLayouts/slideLayout10.xml><?xml version="1.0" encoding="utf-8"?>
+<p:sldLayout xmlns:a="http://schemas.openxmlformats.org/drawingml/2006/main" xmlns:r="http://schemas.openxmlformats.org/officeDocument/2006/relationships" xmlns:p="http://schemas.openxmlformats.org/presentationml/2006/main" preserve="1">
+  <p:cSld name="带标题的全景图片">
+    <p:spTree>
+      <p:nvGrpSpPr>
+        <p:cNvPr id="1" name=""/>
+        <p:cNvGrpSpPr/>
+        <p:nvPr/>
+      </p:nvGrpSpPr>
+      <p:grpSpPr>
+        <a:xfrm>
+          <a:off x="0" y="0"/>
+          <a:ext cx="0" cy="0"/>
+          <a:chOff x="0" y="0"/>
+          <a:chExt cx="0" cy="0"/>
+        </a:xfrm>
+      </p:grpSpPr>
+      <p:sp>
+        <p:nvSpPr>
+          <p:cNvPr id="2" name="Title 1"/>
+          <p:cNvSpPr>
+            <a:spLocks noGrp="1"/>
+          </p:cNvSpPr>
+          <p:nvPr>
+            <p:ph type="title"/>
+          </p:nvPr>
+        </p:nvSpPr>
+        <p:spPr>
+          <a:xfrm>
+            <a:off x="594355" y="4697361"/>
+            <a:ext cx="7956482" cy="819355"/>
+          </a:xfrm>
+        </p:spPr>
+        <p:txBody>
+          <a:bodyPr anchor="b"/>
+          <a:lstStyle>
+            <a:lvl1pPr algn="l">
+              <a:defRPr sz="3200"/>
+            </a:lvl1pPr>
+          </a:lstStyle>
+          <a:p>
+            <a:r>
+              <a:rPr lang="zh-CN" altLang="en-US" smtClean="0"/>
+              <a:t>单击此处编辑母版标题样式</a:t>
+            </a:r>
+            <a:endParaRPr lang="en-US" dirty="0"/>
+          </a:p>
+        </p:txBody>
+      </p:sp>
+      <p:sp>
+        <p:nvSpPr>
+          <p:cNvPr id="3" name="Picture Placeholder 2"/>
+          <p:cNvSpPr>
+            <a:spLocks noGrp="1" noChangeAspect="1"/>
+          </p:cNvSpPr>
+          <p:nvPr>
+            <p:ph type="pic" idx="1"/>
+          </p:nvPr>
+        </p:nvSpPr>
+        <p:spPr>
+          <a:xfrm>
+            <a:off x="594355" y="977035"/>
+            <a:ext cx="7950260" cy="3406972"/>
+          </a:xfrm>
+        </p:spPr>
+        <p:txBody>
+          <a:bodyPr anchor="t"/>
+          <a:lstStyle>
+            <a:lvl1pPr marL="0" indent="0">
+              <a:buNone/>
+              <a:defRPr sz="3200"/>
+            </a:lvl1pPr>
+            <a:lvl2pPr marL="457200" indent="0">
+              <a:buNone/>
+              <a:defRPr sz="2800"/>
+            </a:lvl2pPr>
+            <a:lvl3pPr marL="914400" indent="0">
+              <a:buNone/>
+              <a:defRPr sz="2400"/>
+            </a:lvl3pPr>
+            <a:lvl4pPr marL="1371600" indent="0">
+              <a:buNone/>
+              <a:defRPr sz="2000"/>
+            </a:lvl4pPr>
+            <a:lvl5pPr marL="1828800" indent="0">
+              <a:buNone/>
+              <a:defRPr sz="2000"/>
+            </a:lvl5pPr>
+            <a:lvl6pPr marL="2286000" indent="0">
+              <a:buNone/>
+              <a:defRPr sz="2000"/>
+            </a:lvl6pPr>
+            <a:lvl7pPr marL="2743200" indent="0">
+              <a:buNone/>
+              <a:defRPr sz="2000"/>
+            </a:lvl7pPr>
+            <a:lvl8pPr marL="3200400" indent="0">
+              <a:buNone/>
+              <a:defRPr sz="2000"/>
+            </a:lvl8pPr>
+            <a:lvl9pPr marL="3657600" indent="0">
+              <a:buNone/>
+              <a:defRPr sz="2000"/>
+            </a:lvl9pPr>
+          </a:lstStyle>
+          <a:p>
+            <a:r>
+              <a:rPr lang="zh-CN" altLang="en-US" smtClean="0"/>
+              <a:t>将图片拖动到占位符，或单击添加图标</a:t>
+            </a:r>
+            <a:endParaRPr lang="en-US" dirty="0"/>
+          </a:p>
+        </p:txBody>
+      </p:sp>
+      <p:sp>
+        <p:nvSpPr>
+          <p:cNvPr id="4" name="Text Placeholder 3"/>
+          <p:cNvSpPr>
+            <a:spLocks noGrp="1"/>
+          </p:cNvSpPr>
+          <p:nvPr>
+            <p:ph type="body" sz="half" idx="2"/>
+          </p:nvPr>
+        </p:nvSpPr>
+        <p:spPr>
+          <a:xfrm>
+            <a:off x="594360" y="5516716"/>
+            <a:ext cx="7955280" cy="746924"/>
+          </a:xfrm>
+        </p:spPr>
+        <p:txBody>
+          <a:bodyPr/>
+          <a:lstStyle>
+            <a:lvl1pPr marL="0" indent="0" algn="l">
+              <a:buNone/>
+              <a:defRPr sz="1600"/>
+            </a:lvl1pPr>
+            <a:lvl2pPr marL="457200" indent="0">
+              <a:buNone/>
+              <a:defRPr sz="1400"/>
+            </a:lvl2pPr>
+            <a:lvl3pPr marL="914400" indent="0">
+              <a:buNone/>
+              <a:defRPr sz="1200"/>
+            </a:lvl3pPr>
+            <a:lvl4pPr marL="1371600" indent="0">
+              <a:buNone/>
+              <a:defRPr sz="1000"/>
+            </a:lvl4pPr>
+            <a:lvl5pPr marL="1828800" indent="0">
+              <a:buNone/>
+              <a:defRPr sz="1000"/>
+            </a:lvl5pPr>
+            <a:lvl6pPr marL="2286000" indent="0">
+              <a:buNone/>
+              <a:defRPr sz="1000"/>
+            </a:lvl6pPr>
+            <a:lvl7pPr marL="2743200" indent="0">
+              <a:buNone/>
+              <a:defRPr sz="1000"/>
+            </a:lvl7pPr>
+            <a:lvl8pPr marL="3200400" indent="0">
+              <a:buNone/>
+              <a:defRPr sz="1000"/>
+            </a:lvl8pPr>
+            <a:lvl9pPr marL="3657600" indent="0">
+              <a:buNone/>
+              <a:defRPr sz="1000"/>
+            </a:lvl9pPr>
+          </a:lstStyle>
+          <a:p>
+            <a:pPr lvl="0"/>
+            <a:r>
+              <a:rPr lang="zh-CN" altLang="en-US" smtClean="0"/>
+              <a:t>单击此处编辑母版文本样式</a:t>
+            </a:r>
+          </a:p>
+        </p:txBody>
+      </p:sp>
+      <p:sp>
+        <p:nvSpPr>
+          <p:cNvPr id="5" name="Date Placeholder 4"/>
+          <p:cNvSpPr>
+            <a:spLocks noGrp="1"/>
+          </p:cNvSpPr>
+          <p:nvPr>
+            <p:ph type="dt" sz="half" idx="10"/>
+          </p:nvPr>
+        </p:nvSpPr>
+        <p:spPr/>
+        <p:txBody>
+          <a:bodyPr/>
+          <a:lstStyle/>
+          <a:p>
+            <a:fld id="{827F7EC9-FA32-8F41-831C-53EF8A8DB099}" type="datetime1">
+              <a:rPr kumimoji="1" lang="zh-CN" altLang="en-US" smtClean="0"/>
+              <a:t>2017/11/21</a:t>
+            </a:fld>
+            <a:endParaRPr kumimoji="1" lang="zh-CN" altLang="en-US"/>
+          </a:p>
+        </p:txBody>
+      </p:sp>
+      <p:sp>
+        <p:nvSpPr>
+          <p:cNvPr id="6" name="Footer Placeholder 5"/>
+          <p:cNvSpPr>
+            <a:spLocks noGrp="1"/>
+          </p:cNvSpPr>
+          <p:nvPr>
+            <p:ph type="ftr" sz="quarter" idx="11"/>
+          </p:nvPr>
+        </p:nvSpPr>
+        <p:spPr/>
+        <p:txBody>
+          <a:bodyPr/>
+          <a:lstStyle/>
+          <a:p>
+            <a:endParaRPr kumimoji="1" lang="zh-CN" altLang="en-US"/>
+          </a:p>
+        </p:txBody>
+      </p:sp>
+      <p:sp>
+        <p:nvSpPr>
+          <p:cNvPr id="7" name="Slide Number Placeholder 6"/>
+          <p:cNvSpPr>
+            <a:spLocks noGrp="1"/>
+          </p:cNvSpPr>
+          <p:nvPr>
+            <p:ph type="sldNum" sz="quarter" idx="12"/>
+          </p:nvPr>
+        </p:nvSpPr>
+        <p:spPr/>
+        <p:txBody>
+          <a:bodyPr/>
+          <a:lstStyle/>
+          <a:p>
+            <a:fld id="{12924E00-6951-2E4A-9B91-938056433B77}" type="slidenum">
+              <a:rPr kumimoji="1" lang="zh-CN" altLang="en-US" smtClean="0"/>
+              <a:t>‹#›</a:t>
+            </a:fld>
+            <a:endParaRPr kumimoji="1" lang="zh-CN" altLang="en-US"/>
+          </a:p>
+        </p:txBody>
+      </p:sp>
+    </p:spTree>
+  </p:cSld>
+  <p:clrMapOvr>
+    <a:masterClrMapping/>
+  </p:clrMapOvr>
+  <p:hf hdr="0" ftr="0"/>
+</p:sldLayout>
+</file>
+
+<file path=ppt/slideLayouts/slideLayout11.xml><?xml version="1.0" encoding="utf-8"?>
+<p:sldLayout xmlns:a="http://schemas.openxmlformats.org/drawingml/2006/main" xmlns:r="http://schemas.openxmlformats.org/officeDocument/2006/relationships" xmlns:p="http://schemas.openxmlformats.org/presentationml/2006/main" showMasterSp="0" preserve="1">
+  <p:cSld name="标题和题注">
+    <p:spTree>
+      <p:nvGrpSpPr>
+        <p:cNvPr id="1" name=""/>
+        <p:cNvGrpSpPr/>
+        <p:nvPr/>
+      </p:nvGrpSpPr>
+      <p:grpSpPr>
+        <a:xfrm>
+          <a:off x="0" y="0"/>
+          <a:ext cx="0" cy="0"/>
+          <a:chOff x="0" y="0"/>
+          <a:chExt cx="0" cy="0"/>
+        </a:xfrm>
+      </p:grpSpPr>
+      <p:pic>
+        <p:nvPicPr>
+          <p:cNvPr id="9" name="Picture 8" descr="C0-HD-BTM.png"/>
+          <p:cNvPicPr>
+            <a:picLocks noChangeAspect="1"/>
+          </p:cNvPicPr>
+          <p:nvPr/>
+        </p:nvPicPr>
+        <p:blipFill>
+          <a:blip r:embed="rId2">
+            <a:extLst>
+              <a:ext uri="{28A0092B-C50C-407E-A947-70E740481C1C}">
+                <a14:useLocalDpi xmlns:a14="http://schemas.microsoft.com/office/drawing/2010/main" val="0"/>
+              </a:ext>
+            </a:extLst>
+          </a:blip>
+          <a:stretch>
+            <a:fillRect/>
+          </a:stretch>
+        </p:blipFill>
+        <p:spPr>
+          <a:xfrm>
+            <a:off x="0" y="4995862"/>
+            <a:ext cx="9144000" cy="1862138"/>
+          </a:xfrm>
+          <a:prstGeom prst="rect">
+            <a:avLst/>
+          </a:prstGeom>
+        </p:spPr>
+      </p:pic>
+      <p:sp>
+        <p:nvSpPr>
+          <p:cNvPr id="2" name="Title 1"/>
+          <p:cNvSpPr>
+            <a:spLocks noGrp="1"/>
+          </p:cNvSpPr>
+          <p:nvPr>
+            <p:ph type="title"/>
+          </p:nvPr>
+        </p:nvSpPr>
+        <p:spPr>
+          <a:xfrm>
+            <a:off x="594360" y="753533"/>
+            <a:ext cx="7955280" cy="2802467"/>
+          </a:xfrm>
+        </p:spPr>
+        <p:txBody>
+          <a:bodyPr anchor="ctr"/>
+          <a:lstStyle>
+            <a:lvl1pPr algn="l">
+              <a:defRPr sz="3200"/>
+            </a:lvl1pPr>
+          </a:lstStyle>
+          <a:p>
+            <a:r>
+              <a:rPr lang="zh-CN" altLang="en-US" smtClean="0"/>
+              <a:t>单击此处编辑母版标题样式</a:t>
+            </a:r>
+            <a:endParaRPr lang="en-US" dirty="0"/>
+          </a:p>
+        </p:txBody>
+      </p:sp>
+      <p:sp>
+        <p:nvSpPr>
+          <p:cNvPr id="4" name="Text Placeholder 3"/>
+          <p:cNvSpPr>
+            <a:spLocks noGrp="1"/>
+          </p:cNvSpPr>
+          <p:nvPr>
+            <p:ph type="body" sz="half" idx="2"/>
+          </p:nvPr>
+        </p:nvSpPr>
+        <p:spPr>
+          <a:xfrm>
+            <a:off x="685800" y="3649134"/>
+            <a:ext cx="7772400" cy="1330852"/>
+          </a:xfrm>
+        </p:spPr>
+        <p:txBody>
+          <a:bodyPr anchor="ctr"/>
+          <a:lstStyle>
+            <a:lvl1pPr marL="0" indent="0">
+              <a:buNone/>
+              <a:defRPr sz="1600"/>
+            </a:lvl1pPr>
+            <a:lvl2pPr marL="457200" indent="0">
+              <a:buNone/>
+              <a:defRPr sz="1400"/>
+            </a:lvl2pPr>
+            <a:lvl3pPr marL="914400" indent="0">
+              <a:buNone/>
+              <a:defRPr sz="1200"/>
+            </a:lvl3pPr>
+            <a:lvl4pPr marL="1371600" indent="0">
+              <a:buNone/>
+              <a:defRPr sz="1000"/>
+            </a:lvl4pPr>
+            <a:lvl5pPr marL="1828800" indent="0">
+              <a:buNone/>
+              <a:defRPr sz="1000"/>
+            </a:lvl5pPr>
+            <a:lvl6pPr marL="2286000" indent="0">
+              <a:buNone/>
+              <a:defRPr sz="1000"/>
+            </a:lvl6pPr>
+            <a:lvl7pPr marL="2743200" indent="0">
+              <a:buNone/>
+              <a:defRPr sz="1000"/>
+            </a:lvl7pPr>
+            <a:lvl8pPr marL="3200400" indent="0">
+              <a:buNone/>
+              <a:defRPr sz="1000"/>
+            </a:lvl8pPr>
+            <a:lvl9pPr marL="3657600" indent="0">
+              <a:buNone/>
+              <a:defRPr sz="1000"/>
+            </a:lvl9pPr>
+          </a:lstStyle>
+          <a:p>
+            <a:pPr lvl="0"/>
+            <a:r>
+              <a:rPr lang="zh-CN" altLang="en-US" smtClean="0"/>
+              <a:t>单击此处编辑母版文本样式</a:t>
+            </a:r>
+          </a:p>
+        </p:txBody>
+      </p:sp>
+      <p:sp>
+        <p:nvSpPr>
+          <p:cNvPr id="5" name="Date Placeholder 4"/>
+          <p:cNvSpPr>
+            <a:spLocks noGrp="1"/>
+          </p:cNvSpPr>
+          <p:nvPr>
+            <p:ph type="dt" sz="half" idx="10"/>
+          </p:nvPr>
+        </p:nvSpPr>
+        <p:spPr>
+          <a:xfrm>
+            <a:off x="5562176" y="381001"/>
+            <a:ext cx="2183130" cy="365125"/>
+          </a:xfrm>
+        </p:spPr>
+        <p:txBody>
+          <a:bodyPr/>
+          <a:lstStyle>
+            <a:lvl1pPr algn="r">
+              <a:defRPr/>
+            </a:lvl1pPr>
+          </a:lstStyle>
+          <a:p>
+            <a:fld id="{827F7EC9-FA32-8F41-831C-53EF8A8DB099}" type="datetime1">
+              <a:rPr kumimoji="1" lang="zh-CN" altLang="en-US" smtClean="0"/>
+              <a:t>2017/11/21</a:t>
+            </a:fld>
+            <a:endParaRPr kumimoji="1" lang="zh-CN" altLang="en-US"/>
+          </a:p>
+        </p:txBody>
+      </p:sp>
+      <p:sp>
+        <p:nvSpPr>
+          <p:cNvPr id="6" name="Footer Placeholder 5"/>
+          <p:cNvSpPr>
+            <a:spLocks noGrp="1"/>
+          </p:cNvSpPr>
+          <p:nvPr>
+            <p:ph type="ftr" sz="quarter" idx="11"/>
+          </p:nvPr>
+        </p:nvSpPr>
+        <p:spPr>
+          <a:xfrm>
+            <a:off x="594360" y="381001"/>
+            <a:ext cx="4830656" cy="365125"/>
+          </a:xfrm>
+        </p:spPr>
+        <p:txBody>
+          <a:bodyPr/>
+          <a:lstStyle/>
+          <a:p>
+            <a:endParaRPr kumimoji="1" lang="zh-CN" altLang="en-US"/>
+          </a:p>
+        </p:txBody>
+      </p:sp>
+      <p:sp>
+        <p:nvSpPr>
+          <p:cNvPr id="7" name="Slide Number Placeholder 6"/>
+          <p:cNvSpPr>
+            <a:spLocks noGrp="1"/>
+          </p:cNvSpPr>
+          <p:nvPr>
+            <p:ph type="sldNum" sz="quarter" idx="12"/>
+          </p:nvPr>
+        </p:nvSpPr>
+        <p:spPr>
+          <a:xfrm>
+            <a:off x="7882466" y="381001"/>
+            <a:ext cx="667174" cy="365125"/>
+          </a:xfrm>
+        </p:spPr>
+        <p:txBody>
+          <a:bodyPr/>
+          <a:lstStyle/>
+          <a:p>
+            <a:fld id="{12924E00-6951-2E4A-9B91-938056433B77}" type="slidenum">
+              <a:rPr kumimoji="1" lang="zh-CN" altLang="en-US" smtClean="0"/>
+              <a:t>‹#›</a:t>
+            </a:fld>
+            <a:endParaRPr kumimoji="1" lang="zh-CN" altLang="en-US"/>
+          </a:p>
+        </p:txBody>
+      </p:sp>
+    </p:spTree>
+  </p:cSld>
+  <p:clrMapOvr>
+    <a:masterClrMapping/>
+  </p:clrMapOvr>
+  <p:hf hdr="0" ftr="0"/>
+</p:sldLayout>
+</file>
+
+<file path=ppt/slideLayouts/slideLayout12.xml><?xml version="1.0" encoding="utf-8"?>
+<p:sldLayout xmlns:a="http://schemas.openxmlformats.org/drawingml/2006/main" xmlns:r="http://schemas.openxmlformats.org/officeDocument/2006/relationships" xmlns:p="http://schemas.openxmlformats.org/presentationml/2006/main" showMasterSp="0" preserve="1">
+  <p:cSld name="带标题的引述">
+    <p:spTree>
+      <p:nvGrpSpPr>
+        <p:cNvPr id="1" name=""/>
+        <p:cNvGrpSpPr/>
+        <p:nvPr/>
+      </p:nvGrpSpPr>
+      <p:grpSpPr>
+        <a:xfrm>
+          <a:off x="0" y="0"/>
+          <a:ext cx="0" cy="0"/>
+          <a:chOff x="0" y="0"/>
+          <a:chExt cx="0" cy="0"/>
+        </a:xfrm>
+      </p:grpSpPr>
+      <p:pic>
+        <p:nvPicPr>
+          <p:cNvPr id="11" name="Picture 10" descr="C0-HD-BTM.png"/>
+          <p:cNvPicPr>
+            <a:picLocks noChangeAspect="1"/>
+          </p:cNvPicPr>
+          <p:nvPr/>
+        </p:nvPicPr>
+        <p:blipFill>
+          <a:blip r:embed="rId2">
+            <a:extLst>
+              <a:ext uri="{28A0092B-C50C-407E-A947-70E740481C1C}">
+                <a14:useLocalDpi xmlns:a14="http://schemas.microsoft.com/office/drawing/2010/main" val="0"/>
+              </a:ext>
+            </a:extLst>
+          </a:blip>
+          <a:stretch>
+            <a:fillRect/>
+          </a:stretch>
+        </p:blipFill>
+        <p:spPr>
+          <a:xfrm>
+            <a:off x="0" y="4995862"/>
+            <a:ext cx="9144000" cy="1862138"/>
+          </a:xfrm>
+          <a:prstGeom prst="rect">
+            <a:avLst/>
+          </a:prstGeom>
+        </p:spPr>
+      </p:pic>
+      <p:sp>
+        <p:nvSpPr>
+          <p:cNvPr id="2" name="Title 1"/>
+          <p:cNvSpPr>
+            <a:spLocks noGrp="1"/>
+          </p:cNvSpPr>
+          <p:nvPr>
+            <p:ph type="title"/>
+          </p:nvPr>
+        </p:nvSpPr>
+        <p:spPr>
+          <a:xfrm>
+            <a:off x="768351" y="753534"/>
+            <a:ext cx="7613650" cy="2756234"/>
+          </a:xfrm>
+        </p:spPr>
+        <p:txBody>
+          <a:bodyPr anchor="ctr"/>
+          <a:lstStyle>
+            <a:lvl1pPr algn="l">
+              <a:defRPr sz="3200"/>
+            </a:lvl1pPr>
+          </a:lstStyle>
+          <a:p>
+            <a:r>
+              <a:rPr lang="zh-CN" altLang="en-US" smtClean="0"/>
+              <a:t>单击此处编辑母版标题样式</a:t>
+            </a:r>
+            <a:endParaRPr lang="en-US" dirty="0"/>
+          </a:p>
+        </p:txBody>
+      </p:sp>
+      <p:sp>
+        <p:nvSpPr>
+          <p:cNvPr id="12" name="Text Placeholder 3"/>
+          <p:cNvSpPr>
+            <a:spLocks noGrp="1"/>
+          </p:cNvSpPr>
+          <p:nvPr>
+            <p:ph type="body" sz="half" idx="13"/>
+          </p:nvPr>
+        </p:nvSpPr>
+        <p:spPr>
+          <a:xfrm>
+            <a:off x="977899" y="3509768"/>
+            <a:ext cx="7194552" cy="444443"/>
+          </a:xfrm>
+        </p:spPr>
+        <p:txBody>
+          <a:bodyPr anchor="t">
+            <a:normAutofit/>
+          </a:bodyPr>
+          <a:lstStyle>
+            <a:lvl1pPr marL="0" indent="0">
+              <a:buNone/>
+              <a:defRPr sz="1400"/>
+            </a:lvl1pPr>
+            <a:lvl2pPr marL="457200" indent="0">
+              <a:buNone/>
+              <a:defRPr sz="1400"/>
+            </a:lvl2pPr>
+            <a:lvl3pPr marL="914400" indent="0">
+              <a:buNone/>
+              <a:defRPr sz="1200"/>
+            </a:lvl3pPr>
+            <a:lvl4pPr marL="1371600" indent="0">
+              <a:buNone/>
+              <a:defRPr sz="1000"/>
+            </a:lvl4pPr>
+            <a:lvl5pPr marL="1828800" indent="0">
+              <a:buNone/>
+              <a:defRPr sz="1000"/>
+            </a:lvl5pPr>
+            <a:lvl6pPr marL="2286000" indent="0">
+              <a:buNone/>
+              <a:defRPr sz="1000"/>
+            </a:lvl6pPr>
+            <a:lvl7pPr marL="2743200" indent="0">
+              <a:buNone/>
+              <a:defRPr sz="1000"/>
+            </a:lvl7pPr>
+            <a:lvl8pPr marL="3200400" indent="0">
+              <a:buNone/>
+              <a:defRPr sz="1000"/>
+            </a:lvl8pPr>
+            <a:lvl9pPr marL="3657600" indent="0">
+              <a:buNone/>
+              <a:defRPr sz="1000"/>
+            </a:lvl9pPr>
+          </a:lstStyle>
+          <a:p>
+            <a:pPr lvl="0"/>
+            <a:r>
+              <a:rPr lang="zh-CN" altLang="en-US" smtClean="0"/>
+              <a:t>单击此处编辑母版文本样式</a:t>
+            </a:r>
+          </a:p>
+        </p:txBody>
+      </p:sp>
+      <p:sp>
+        <p:nvSpPr>
+          <p:cNvPr id="4" name="Text Placeholder 3"/>
+          <p:cNvSpPr>
+            <a:spLocks noGrp="1"/>
+          </p:cNvSpPr>
+          <p:nvPr>
+            <p:ph type="body" sz="half" idx="2"/>
+          </p:nvPr>
+        </p:nvSpPr>
+        <p:spPr>
+          <a:xfrm>
+            <a:off x="685800" y="4174597"/>
+            <a:ext cx="7778752" cy="821265"/>
+          </a:xfrm>
+        </p:spPr>
+        <p:txBody>
+          <a:bodyPr anchor="ctr">
+            <a:normAutofit/>
+          </a:bodyPr>
+          <a:lstStyle>
+            <a:lvl1pPr marL="0" indent="0">
+              <a:buNone/>
+              <a:defRPr sz="1600"/>
+            </a:lvl1pPr>
+            <a:lvl2pPr marL="457200" indent="0">
+              <a:buNone/>
+              <a:defRPr sz="1400"/>
+            </a:lvl2pPr>
+            <a:lvl3pPr marL="914400" indent="0">
+              <a:buNone/>
+              <a:defRPr sz="1200"/>
+            </a:lvl3pPr>
+            <a:lvl4pPr marL="1371600" indent="0">
+              <a:buNone/>
+              <a:defRPr sz="1000"/>
+            </a:lvl4pPr>
+            <a:lvl5pPr marL="1828800" indent="0">
+              <a:buNone/>
+              <a:defRPr sz="1000"/>
+            </a:lvl5pPr>
+            <a:lvl6pPr marL="2286000" indent="0">
+              <a:buNone/>
+              <a:defRPr sz="1000"/>
+            </a:lvl6pPr>
+            <a:lvl7pPr marL="2743200" indent="0">
+              <a:buNone/>
+              <a:defRPr sz="1000"/>
+            </a:lvl7pPr>
+            <a:lvl8pPr marL="3200400" indent="0">
+              <a:buNone/>
+              <a:defRPr sz="1000"/>
+            </a:lvl8pPr>
+            <a:lvl9pPr marL="3657600" indent="0">
+              <a:buNone/>
+              <a:defRPr sz="1000"/>
+            </a:lvl9pPr>
+          </a:lstStyle>
+          <a:p>
+            <a:pPr lvl="0"/>
+            <a:r>
+              <a:rPr lang="zh-CN" altLang="en-US" smtClean="0"/>
+              <a:t>单击此处编辑母版文本样式</a:t>
+            </a:r>
+          </a:p>
+        </p:txBody>
+      </p:sp>
+      <p:sp>
+        <p:nvSpPr>
+          <p:cNvPr id="5" name="Date Placeholder 4"/>
+          <p:cNvSpPr>
+            <a:spLocks noGrp="1"/>
+          </p:cNvSpPr>
+          <p:nvPr>
+            <p:ph type="dt" sz="half" idx="10"/>
+          </p:nvPr>
+        </p:nvSpPr>
+        <p:spPr>
+          <a:xfrm>
+            <a:off x="5562176" y="381001"/>
+            <a:ext cx="2183130" cy="365125"/>
+          </a:xfrm>
+        </p:spPr>
+        <p:txBody>
+          <a:bodyPr/>
+          <a:lstStyle>
+            <a:lvl1pPr algn="r">
+              <a:defRPr/>
+            </a:lvl1pPr>
+          </a:lstStyle>
+          <a:p>
+            <a:fld id="{827F7EC9-FA32-8F41-831C-53EF8A8DB099}" type="datetime1">
+              <a:rPr kumimoji="1" lang="zh-CN" altLang="en-US" smtClean="0"/>
+              <a:t>2017/11/21</a:t>
+            </a:fld>
+            <a:endParaRPr kumimoji="1" lang="zh-CN" altLang="en-US"/>
+          </a:p>
+        </p:txBody>
+      </p:sp>
+      <p:sp>
+        <p:nvSpPr>
+          <p:cNvPr id="6" name="Footer Placeholder 5"/>
+          <p:cNvSpPr>
+            <a:spLocks noGrp="1"/>
+          </p:cNvSpPr>
+          <p:nvPr>
+            <p:ph type="ftr" sz="quarter" idx="11"/>
+          </p:nvPr>
+        </p:nvSpPr>
+        <p:spPr>
+          <a:xfrm>
+            <a:off x="594360" y="379438"/>
+            <a:ext cx="4830656" cy="365125"/>
+          </a:xfrm>
+        </p:spPr>
+        <p:txBody>
+          <a:bodyPr/>
+          <a:lstStyle/>
+          <a:p>
+            <a:endParaRPr kumimoji="1" lang="zh-CN" altLang="en-US"/>
+          </a:p>
+        </p:txBody>
+      </p:sp>
+      <p:sp>
+        <p:nvSpPr>
+          <p:cNvPr id="7" name="Slide Number Placeholder 6"/>
+          <p:cNvSpPr>
+            <a:spLocks noGrp="1"/>
+          </p:cNvSpPr>
+          <p:nvPr>
+            <p:ph type="sldNum" sz="quarter" idx="12"/>
+          </p:nvPr>
+        </p:nvSpPr>
+        <p:spPr>
+          <a:xfrm>
+            <a:off x="7882466" y="381001"/>
+            <a:ext cx="667174" cy="365125"/>
+          </a:xfrm>
+        </p:spPr>
+        <p:txBody>
+          <a:bodyPr/>
+          <a:lstStyle/>
+          <a:p>
+            <a:fld id="{12924E00-6951-2E4A-9B91-938056433B77}" type="slidenum">
+              <a:rPr kumimoji="1" lang="zh-CN" altLang="en-US" smtClean="0"/>
+              <a:t>‹#›</a:t>
+            </a:fld>
+            <a:endParaRPr kumimoji="1" lang="zh-CN" altLang="en-US"/>
+          </a:p>
+        </p:txBody>
+      </p:sp>
+      <p:sp>
+        <p:nvSpPr>
+          <p:cNvPr id="13" name="TextBox 12"/>
+          <p:cNvSpPr txBox="1"/>
+          <p:nvPr/>
+        </p:nvSpPr>
+        <p:spPr>
+          <a:xfrm>
+            <a:off x="231458" y="807720"/>
+            <a:ext cx="457200" cy="584776"/>
+          </a:xfrm>
+          <a:prstGeom prst="rect">
+            <a:avLst/>
+          </a:prstGeom>
+        </p:spPr>
+        <p:txBody>
+          <a:bodyPr vert="horz" lIns="91440" tIns="45720" rIns="91440" bIns="45720" rtlCol="0" anchor="ctr">
+            <a:noAutofit/>
+          </a:bodyPr>
+          <a:lstStyle>
+            <a:lvl1pPr>
+              <a:spcBef>
+                <a:spcPct val="0"/>
+              </a:spcBef>
+              <a:buNone/>
+              <a:defRPr sz="3200" b="0" cap="all">
+                <a:ln w="3175" cmpd="sng">
+                  <a:noFill/>
+                </a:ln>
+                <a:effectLst>
+                  <a:glow rad="38100">
+                    <a:schemeClr val="bg1">
+                      <a:lumMod val="65000"/>
+                      <a:lumOff val="35000"/>
+                      <a:alpha val="40000"/>
+                    </a:schemeClr>
+                  </a:glow>
+                  <a:outerShdw blurRad="28575" dist="38100" dir="14040000" algn="tl" rotWithShape="0">
+                    <a:srgbClr val="000000">
+                      <a:alpha val="25000"/>
+                    </a:srgbClr>
+                  </a:outerShdw>
+                </a:effectLst>
+              </a:defRPr>
+            </a:lvl1pPr>
+            <a:lvl2pPr>
+              <a:defRPr>
+                <a:solidFill>
+                  <a:schemeClr val="tx2"/>
+                </a:solidFill>
+              </a:defRPr>
+            </a:lvl2pPr>
+            <a:lvl3pPr>
+              <a:defRPr>
+                <a:solidFill>
+                  <a:schemeClr val="tx2"/>
+                </a:solidFill>
+              </a:defRPr>
+            </a:lvl3pPr>
+            <a:lvl4pPr>
+              <a:defRPr>
+                <a:solidFill>
+                  <a:schemeClr val="tx2"/>
+                </a:solidFill>
+              </a:defRPr>
+            </a:lvl4pPr>
+            <a:lvl5pPr>
+              <a:defRPr>
+                <a:solidFill>
+                  <a:schemeClr val="tx2"/>
+                </a:solidFill>
+              </a:defRPr>
+            </a:lvl5pPr>
+            <a:lvl6pPr>
+              <a:defRPr>
+                <a:solidFill>
+                  <a:schemeClr val="tx2"/>
+                </a:solidFill>
+              </a:defRPr>
+            </a:lvl6pPr>
+            <a:lvl7pPr>
+              <a:defRPr>
+                <a:solidFill>
+                  <a:schemeClr val="tx2"/>
+                </a:solidFill>
+              </a:defRPr>
+            </a:lvl7pPr>
+            <a:lvl8pPr>
+              <a:defRPr>
+                <a:solidFill>
+                  <a:schemeClr val="tx2"/>
+                </a:solidFill>
+              </a:defRPr>
+            </a:lvl8pPr>
+            <a:lvl9pPr>
+              <a:defRPr>
+                <a:solidFill>
+                  <a:schemeClr val="tx2"/>
+                </a:solidFill>
+              </a:defRPr>
+            </a:lvl9pPr>
+          </a:lstStyle>
+          <a:p>
+            <a:pPr lvl="0"/>
+            <a:r>
+              <a:rPr lang="en-US" sz="8000" dirty="0">
+                <a:solidFill>
+                  <a:schemeClr val="tx1"/>
+                </a:solidFill>
+                <a:effectLst/>
+              </a:rPr>
+              <a:t>“</a:t>
+            </a:r>
+          </a:p>
+        </p:txBody>
+      </p:sp>
+      <p:sp>
+        <p:nvSpPr>
+          <p:cNvPr id="14" name="TextBox 13"/>
+          <p:cNvSpPr txBox="1"/>
+          <p:nvPr/>
+        </p:nvSpPr>
+        <p:spPr>
+          <a:xfrm>
+            <a:off x="8146733" y="3021330"/>
+            <a:ext cx="457200" cy="584776"/>
+          </a:xfrm>
+          <a:prstGeom prst="rect">
+            <a:avLst/>
+          </a:prstGeom>
+        </p:spPr>
+        <p:txBody>
+          <a:bodyPr vert="horz" lIns="91440" tIns="45720" rIns="91440" bIns="45720" rtlCol="0" anchor="ctr">
+            <a:noAutofit/>
+          </a:bodyPr>
+          <a:lstStyle>
+            <a:lvl1pPr>
+              <a:spcBef>
+                <a:spcPct val="0"/>
+              </a:spcBef>
+              <a:buNone/>
+              <a:defRPr sz="3200" b="0" cap="all">
+                <a:ln w="3175" cmpd="sng">
+                  <a:noFill/>
+                </a:ln>
+                <a:effectLst>
+                  <a:glow rad="38100">
+                    <a:schemeClr val="bg1">
+                      <a:lumMod val="65000"/>
+                      <a:lumOff val="35000"/>
+                      <a:alpha val="40000"/>
+                    </a:schemeClr>
+                  </a:glow>
+                  <a:outerShdw blurRad="28575" dist="38100" dir="14040000" algn="tl" rotWithShape="0">
+                    <a:srgbClr val="000000">
+                      <a:alpha val="25000"/>
+                    </a:srgbClr>
+                  </a:outerShdw>
+                </a:effectLst>
+              </a:defRPr>
+            </a:lvl1pPr>
+            <a:lvl2pPr>
+              <a:defRPr>
+                <a:solidFill>
+                  <a:schemeClr val="tx2"/>
+                </a:solidFill>
+              </a:defRPr>
+            </a:lvl2pPr>
+            <a:lvl3pPr>
+              <a:defRPr>
+                <a:solidFill>
+                  <a:schemeClr val="tx2"/>
+                </a:solidFill>
+              </a:defRPr>
+            </a:lvl3pPr>
+            <a:lvl4pPr>
+              <a:defRPr>
+                <a:solidFill>
+                  <a:schemeClr val="tx2"/>
+                </a:solidFill>
+              </a:defRPr>
+            </a:lvl4pPr>
+            <a:lvl5pPr>
+              <a:defRPr>
+                <a:solidFill>
+                  <a:schemeClr val="tx2"/>
+                </a:solidFill>
+              </a:defRPr>
+            </a:lvl5pPr>
+            <a:lvl6pPr>
+              <a:defRPr>
+                <a:solidFill>
+                  <a:schemeClr val="tx2"/>
+                </a:solidFill>
+              </a:defRPr>
+            </a:lvl6pPr>
+            <a:lvl7pPr>
+              <a:defRPr>
+                <a:solidFill>
+                  <a:schemeClr val="tx2"/>
+                </a:solidFill>
+              </a:defRPr>
+            </a:lvl7pPr>
+            <a:lvl8pPr>
+              <a:defRPr>
+                <a:solidFill>
+                  <a:schemeClr val="tx2"/>
+                </a:solidFill>
+              </a:defRPr>
+            </a:lvl8pPr>
+            <a:lvl9pPr>
+              <a:defRPr>
+                <a:solidFill>
+                  <a:schemeClr val="tx2"/>
+                </a:solidFill>
+              </a:defRPr>
+            </a:lvl9pPr>
+          </a:lstStyle>
+          <a:p>
+            <a:pPr lvl="0" algn="r"/>
+            <a:r>
+              <a:rPr lang="en-US" sz="8000" dirty="0">
+                <a:solidFill>
+                  <a:schemeClr val="tx1"/>
+                </a:solidFill>
+                <a:effectLst/>
+              </a:rPr>
+              <a:t>”</a:t>
+            </a:r>
+          </a:p>
+        </p:txBody>
+      </p:sp>
+    </p:spTree>
+  </p:cSld>
+  <p:clrMapOvr>
+    <a:masterClrMapping/>
+  </p:clrMapOvr>
+  <p:hf hdr="0" ftr="0"/>
+</p:sldLayout>
+</file>
+
+<file path=ppt/slideLayouts/slideLayout13.xml><?xml version="1.0" encoding="utf-8"?>
+<p:sldLayout xmlns:a="http://schemas.openxmlformats.org/drawingml/2006/main" xmlns:r="http://schemas.openxmlformats.org/officeDocument/2006/relationships" xmlns:p="http://schemas.openxmlformats.org/presentationml/2006/main" showMasterSp="0" preserve="1">
+  <p:cSld name="名片">
+    <p:spTree>
+      <p:nvGrpSpPr>
+        <p:cNvPr id="1" name=""/>
+        <p:cNvGrpSpPr/>
+        <p:nvPr/>
+      </p:nvGrpSpPr>
+      <p:grpSpPr>
+        <a:xfrm>
+          <a:off x="0" y="0"/>
+          <a:ext cx="0" cy="0"/>
+          <a:chOff x="0" y="0"/>
+          <a:chExt cx="0" cy="0"/>
+        </a:xfrm>
+      </p:grpSpPr>
+      <p:pic>
+        <p:nvPicPr>
+          <p:cNvPr id="8" name="Picture 7" descr="C0-HD-BTM.png"/>
+          <p:cNvPicPr>
+            <a:picLocks noChangeAspect="1"/>
+          </p:cNvPicPr>
+          <p:nvPr/>
+        </p:nvPicPr>
+        <p:blipFill>
+          <a:blip r:embed="rId2">
+            <a:extLst>
+              <a:ext uri="{28A0092B-C50C-407E-A947-70E740481C1C}">
+                <a14:useLocalDpi xmlns:a14="http://schemas.microsoft.com/office/drawing/2010/main" val="0"/>
+              </a:ext>
+            </a:extLst>
+          </a:blip>
+          <a:stretch>
+            <a:fillRect/>
+          </a:stretch>
+        </p:blipFill>
+        <p:spPr>
+          <a:xfrm>
+            <a:off x="0" y="4995862"/>
+            <a:ext cx="9144000" cy="1862138"/>
+          </a:xfrm>
+          <a:prstGeom prst="rect">
+            <a:avLst/>
+          </a:prstGeom>
+        </p:spPr>
+      </p:pic>
+      <p:sp>
+        <p:nvSpPr>
+          <p:cNvPr id="2" name="Title 1"/>
+          <p:cNvSpPr>
+            <a:spLocks noGrp="1"/>
+          </p:cNvSpPr>
+          <p:nvPr>
+            <p:ph type="title"/>
+          </p:nvPr>
+        </p:nvSpPr>
+        <p:spPr>
+          <a:xfrm>
+            <a:off x="685800" y="1124702"/>
+            <a:ext cx="7774782" cy="2511835"/>
+          </a:xfrm>
+        </p:spPr>
+        <p:txBody>
+          <a:bodyPr anchor="b"/>
+          <a:lstStyle>
+            <a:lvl1pPr algn="l">
+              <a:defRPr sz="3200"/>
+            </a:lvl1pPr>
+          </a:lstStyle>
+          <a:p>
+            <a:r>
+              <a:rPr lang="zh-CN" altLang="en-US" smtClean="0"/>
+              <a:t>单击此处编辑母版标题样式</a:t>
+            </a:r>
+            <a:endParaRPr lang="en-US" dirty="0"/>
+          </a:p>
+        </p:txBody>
+      </p:sp>
+      <p:sp>
+        <p:nvSpPr>
+          <p:cNvPr id="4" name="Text Placeholder 3"/>
+          <p:cNvSpPr>
+            <a:spLocks noGrp="1"/>
+          </p:cNvSpPr>
+          <p:nvPr>
+            <p:ph type="body" sz="half" idx="2"/>
+          </p:nvPr>
+        </p:nvSpPr>
+        <p:spPr>
+          <a:xfrm>
+            <a:off x="685792" y="3648316"/>
+            <a:ext cx="7773608" cy="999885"/>
+          </a:xfrm>
+        </p:spPr>
+        <p:txBody>
+          <a:bodyPr anchor="t"/>
+          <a:lstStyle>
+            <a:lvl1pPr marL="0" indent="0">
+              <a:buNone/>
+              <a:defRPr sz="1600"/>
+            </a:lvl1pPr>
+            <a:lvl2pPr marL="457200" indent="0">
+              <a:buNone/>
+              <a:defRPr sz="1400"/>
+            </a:lvl2pPr>
+            <a:lvl3pPr marL="914400" indent="0">
+              <a:buNone/>
+              <a:defRPr sz="1200"/>
+            </a:lvl3pPr>
+            <a:lvl4pPr marL="1371600" indent="0">
+              <a:buNone/>
+              <a:defRPr sz="1000"/>
+            </a:lvl4pPr>
+            <a:lvl5pPr marL="1828800" indent="0">
+              <a:buNone/>
+              <a:defRPr sz="1000"/>
+            </a:lvl5pPr>
+            <a:lvl6pPr marL="2286000" indent="0">
+              <a:buNone/>
+              <a:defRPr sz="1000"/>
+            </a:lvl6pPr>
+            <a:lvl7pPr marL="2743200" indent="0">
+              <a:buNone/>
+              <a:defRPr sz="1000"/>
+            </a:lvl7pPr>
+            <a:lvl8pPr marL="3200400" indent="0">
+              <a:buNone/>
+              <a:defRPr sz="1000"/>
+            </a:lvl8pPr>
+            <a:lvl9pPr marL="3657600" indent="0">
+              <a:buNone/>
+              <a:defRPr sz="1000"/>
+            </a:lvl9pPr>
+          </a:lstStyle>
+          <a:p>
+            <a:pPr lvl="0"/>
+            <a:r>
+              <a:rPr lang="zh-CN" altLang="en-US" smtClean="0"/>
+              <a:t>单击此处编辑母版文本样式</a:t>
+            </a:r>
+          </a:p>
+        </p:txBody>
+      </p:sp>
+      <p:sp>
+        <p:nvSpPr>
+          <p:cNvPr id="5" name="Date Placeholder 4"/>
+          <p:cNvSpPr>
+            <a:spLocks noGrp="1"/>
+          </p:cNvSpPr>
+          <p:nvPr>
+            <p:ph type="dt" sz="half" idx="10"/>
+          </p:nvPr>
+        </p:nvSpPr>
+        <p:spPr>
+          <a:xfrm>
+            <a:off x="5562176" y="378884"/>
+            <a:ext cx="2183130" cy="365125"/>
+          </a:xfrm>
+        </p:spPr>
+        <p:txBody>
+          <a:bodyPr/>
+          <a:lstStyle>
+            <a:lvl1pPr algn="r">
+              <a:defRPr/>
+            </a:lvl1pPr>
+          </a:lstStyle>
+          <a:p>
+            <a:fld id="{827F7EC9-FA32-8F41-831C-53EF8A8DB099}" type="datetime1">
+              <a:rPr kumimoji="1" lang="zh-CN" altLang="en-US" smtClean="0"/>
+              <a:t>2017/11/21</a:t>
+            </a:fld>
+            <a:endParaRPr kumimoji="1" lang="zh-CN" altLang="en-US"/>
+          </a:p>
+        </p:txBody>
+      </p:sp>
+      <p:sp>
+        <p:nvSpPr>
+          <p:cNvPr id="6" name="Footer Placeholder 5"/>
+          <p:cNvSpPr>
+            <a:spLocks noGrp="1"/>
+          </p:cNvSpPr>
+          <p:nvPr>
+            <p:ph type="ftr" sz="quarter" idx="11"/>
+          </p:nvPr>
+        </p:nvSpPr>
+        <p:spPr>
+          <a:xfrm>
+            <a:off x="594360" y="378884"/>
+            <a:ext cx="4830656" cy="365125"/>
+          </a:xfrm>
+        </p:spPr>
+        <p:txBody>
+          <a:bodyPr/>
+          <a:lstStyle/>
+          <a:p>
+            <a:endParaRPr kumimoji="1" lang="zh-CN" altLang="en-US"/>
+          </a:p>
+        </p:txBody>
+      </p:sp>
+      <p:sp>
+        <p:nvSpPr>
+          <p:cNvPr id="7" name="Slide Number Placeholder 6"/>
+          <p:cNvSpPr>
+            <a:spLocks noGrp="1"/>
+          </p:cNvSpPr>
+          <p:nvPr>
+            <p:ph type="sldNum" sz="quarter" idx="12"/>
+          </p:nvPr>
+        </p:nvSpPr>
+        <p:spPr>
+          <a:xfrm>
+            <a:off x="7882466" y="381001"/>
+            <a:ext cx="667174" cy="365125"/>
+          </a:xfrm>
+        </p:spPr>
+        <p:txBody>
+          <a:bodyPr/>
+          <a:lstStyle/>
+          <a:p>
+            <a:fld id="{12924E00-6951-2E4A-9B91-938056433B77}" type="slidenum">
+              <a:rPr kumimoji="1" lang="zh-CN" altLang="en-US" smtClean="0"/>
+              <a:t>‹#›</a:t>
+            </a:fld>
+            <a:endParaRPr kumimoji="1" lang="zh-CN" altLang="en-US"/>
+          </a:p>
+        </p:txBody>
+      </p:sp>
+    </p:spTree>
+  </p:cSld>
+  <p:clrMapOvr>
+    <a:masterClrMapping/>
+  </p:clrMapOvr>
+  <p:hf hdr="0" ftr="0"/>
+</p:sldLayout>
+</file>
+
+<file path=ppt/slideLayouts/slideLayout14.xml><?xml version="1.0" encoding="utf-8"?>
+<p:sldLayout xmlns:a="http://schemas.openxmlformats.org/drawingml/2006/main" xmlns:r="http://schemas.openxmlformats.org/officeDocument/2006/relationships" xmlns:p="http://schemas.openxmlformats.org/presentationml/2006/main" preserve="1">
+  <p:cSld name="三栏">
+    <p:spTree>
+      <p:nvGrpSpPr>
+        <p:cNvPr id="1" name=""/>
+        <p:cNvGrpSpPr/>
+        <p:nvPr/>
+      </p:nvGrpSpPr>
+      <p:grpSpPr>
+        <a:xfrm>
+          <a:off x="0" y="0"/>
+          <a:ext cx="0" cy="0"/>
+          <a:chOff x="0" y="0"/>
+          <a:chExt cx="0" cy="0"/>
+        </a:xfrm>
+      </p:grpSpPr>
+      <p:sp>
+        <p:nvSpPr>
+          <p:cNvPr id="15" name="Title 1"/>
+          <p:cNvSpPr>
+            <a:spLocks noGrp="1"/>
+          </p:cNvSpPr>
+          <p:nvPr>
+            <p:ph type="title"/>
+          </p:nvPr>
+        </p:nvSpPr>
+        <p:spPr>
+          <a:xfrm>
+            <a:off x="2171701" y="762000"/>
+            <a:ext cx="6377939" cy="1303867"/>
+          </a:xfrm>
+        </p:spPr>
+        <p:txBody>
+          <a:bodyPr/>
+          <a:lstStyle/>
+          <a:p>
+            <a:r>
+              <a:rPr lang="zh-CN" altLang="en-US" smtClean="0"/>
+              <a:t>单击此处编辑母版标题样式</a:t>
+            </a:r>
+            <a:endParaRPr lang="en-US" dirty="0"/>
+          </a:p>
+        </p:txBody>
+      </p:sp>
+      <p:sp>
+        <p:nvSpPr>
+          <p:cNvPr id="7" name="Text Placeholder 2"/>
+          <p:cNvSpPr>
+            <a:spLocks noGrp="1"/>
+          </p:cNvSpPr>
+          <p:nvPr>
+            <p:ph type="body" idx="1"/>
+          </p:nvPr>
+        </p:nvSpPr>
+        <p:spPr>
+          <a:xfrm>
+            <a:off x="594361" y="2202080"/>
+            <a:ext cx="2560320" cy="617320"/>
+          </a:xfrm>
+        </p:spPr>
+        <p:txBody>
+          <a:bodyPr anchor="b">
+            <a:noAutofit/>
+          </a:bodyPr>
+          <a:lstStyle>
+            <a:lvl1pPr marL="0" indent="0">
+              <a:buNone/>
+              <a:defRPr sz="2400" b="0">
+                <a:solidFill>
+                  <a:schemeClr val="tx1"/>
+                </a:solidFill>
+              </a:defRPr>
+            </a:lvl1pPr>
+            <a:lvl2pPr marL="457200" indent="0">
+              <a:buNone/>
+              <a:defRPr sz="2000" b="1"/>
+            </a:lvl2pPr>
+            <a:lvl3pPr marL="914400" indent="0">
+              <a:buNone/>
+              <a:defRPr sz="1800" b="1"/>
+            </a:lvl3pPr>
+            <a:lvl4pPr marL="1371600" indent="0">
+              <a:buNone/>
+              <a:defRPr sz="1600" b="1"/>
+            </a:lvl4pPr>
+            <a:lvl5pPr marL="1828800" indent="0">
+              <a:buNone/>
+              <a:defRPr sz="1600" b="1"/>
+            </a:lvl5pPr>
+            <a:lvl6pPr marL="2286000" indent="0">
+              <a:buNone/>
+              <a:defRPr sz="1600" b="1"/>
+            </a:lvl6pPr>
+            <a:lvl7pPr marL="2743200" indent="0">
+              <a:buNone/>
+              <a:defRPr sz="1600" b="1"/>
+            </a:lvl7pPr>
+            <a:lvl8pPr marL="3200400" indent="0">
+              <a:buNone/>
+              <a:defRPr sz="1600" b="1"/>
+            </a:lvl8pPr>
+            <a:lvl9pPr marL="3657600" indent="0">
+              <a:buNone/>
+              <a:defRPr sz="1600" b="1"/>
+            </a:lvl9pPr>
+          </a:lstStyle>
+          <a:p>
+            <a:pPr lvl="0"/>
+            <a:r>
+              <a:rPr lang="zh-CN" altLang="en-US" smtClean="0"/>
+              <a:t>单击此处编辑母版文本样式</a:t>
+            </a:r>
+          </a:p>
+        </p:txBody>
+      </p:sp>
+      <p:sp>
+        <p:nvSpPr>
+          <p:cNvPr id="8" name="Text Placeholder 3"/>
+          <p:cNvSpPr>
+            <a:spLocks noGrp="1"/>
+          </p:cNvSpPr>
+          <p:nvPr>
+            <p:ph type="body" sz="half" idx="15"/>
+          </p:nvPr>
+        </p:nvSpPr>
+        <p:spPr>
+          <a:xfrm>
+            <a:off x="594360" y="2904564"/>
+            <a:ext cx="2560320" cy="3359079"/>
+          </a:xfrm>
+        </p:spPr>
+        <p:txBody>
+          <a:bodyPr anchor="t">
+            <a:normAutofit/>
+          </a:bodyPr>
+          <a:lstStyle>
+            <a:lvl1pPr marL="0" indent="0">
+              <a:buNone/>
+              <a:defRPr sz="1400"/>
+            </a:lvl1pPr>
+            <a:lvl2pPr marL="457200" indent="0">
+              <a:buNone/>
+              <a:defRPr sz="1200"/>
+            </a:lvl2pPr>
+            <a:lvl3pPr marL="914400" indent="0">
+              <a:buNone/>
+              <a:defRPr sz="1000"/>
+            </a:lvl3pPr>
+            <a:lvl4pPr marL="1371600" indent="0">
+              <a:buNone/>
+              <a:defRPr sz="900"/>
+            </a:lvl4pPr>
+            <a:lvl5pPr marL="1828800" indent="0">
+              <a:buNone/>
+              <a:defRPr sz="900"/>
+            </a:lvl5pPr>
+            <a:lvl6pPr marL="2286000" indent="0">
+              <a:buNone/>
+              <a:defRPr sz="900"/>
+            </a:lvl6pPr>
+            <a:lvl7pPr marL="2743200" indent="0">
+              <a:buNone/>
+              <a:defRPr sz="900"/>
+            </a:lvl7pPr>
+            <a:lvl8pPr marL="3200400" indent="0">
+              <a:buNone/>
+              <a:defRPr sz="900"/>
+            </a:lvl8pPr>
+            <a:lvl9pPr marL="3657600" indent="0">
+              <a:buNone/>
+              <a:defRPr sz="900"/>
+            </a:lvl9pPr>
+          </a:lstStyle>
+          <a:p>
+            <a:pPr lvl="0"/>
+            <a:r>
+              <a:rPr lang="zh-CN" altLang="en-US" smtClean="0"/>
+              <a:t>单击此处编辑母版文本样式</a:t>
+            </a:r>
+          </a:p>
+        </p:txBody>
+      </p:sp>
+      <p:sp>
+        <p:nvSpPr>
+          <p:cNvPr id="9" name="Text Placeholder 4"/>
+          <p:cNvSpPr>
+            <a:spLocks noGrp="1"/>
+          </p:cNvSpPr>
+          <p:nvPr>
+            <p:ph type="body" sz="quarter" idx="3"/>
+          </p:nvPr>
+        </p:nvSpPr>
+        <p:spPr>
+          <a:xfrm>
+            <a:off x="3302237" y="2201333"/>
+            <a:ext cx="2560320" cy="626534"/>
+          </a:xfrm>
+        </p:spPr>
+        <p:txBody>
+          <a:bodyPr anchor="b">
+            <a:noAutofit/>
+          </a:bodyPr>
+          <a:lstStyle>
+            <a:lvl1pPr marL="0" indent="0">
+              <a:buNone/>
+              <a:defRPr sz="2400" b="0">
+                <a:solidFill>
+                  <a:schemeClr val="tx1"/>
+                </a:solidFill>
+              </a:defRPr>
+            </a:lvl1pPr>
+            <a:lvl2pPr marL="457200" indent="0">
+              <a:buNone/>
+              <a:defRPr sz="2000" b="1"/>
+            </a:lvl2pPr>
+            <a:lvl3pPr marL="914400" indent="0">
+              <a:buNone/>
+              <a:defRPr sz="1800" b="1"/>
+            </a:lvl3pPr>
+            <a:lvl4pPr marL="1371600" indent="0">
+              <a:buNone/>
+              <a:defRPr sz="1600" b="1"/>
+            </a:lvl4pPr>
+            <a:lvl5pPr marL="1828800" indent="0">
+              <a:buNone/>
+              <a:defRPr sz="1600" b="1"/>
+            </a:lvl5pPr>
+            <a:lvl6pPr marL="2286000" indent="0">
+              <a:buNone/>
+              <a:defRPr sz="1600" b="1"/>
+            </a:lvl6pPr>
+            <a:lvl7pPr marL="2743200" indent="0">
+              <a:buNone/>
+              <a:defRPr sz="1600" b="1"/>
+            </a:lvl7pPr>
+            <a:lvl8pPr marL="3200400" indent="0">
+              <a:buNone/>
+              <a:defRPr sz="1600" b="1"/>
+            </a:lvl8pPr>
+            <a:lvl9pPr marL="3657600" indent="0">
+              <a:buNone/>
+              <a:defRPr sz="1600" b="1"/>
+            </a:lvl9pPr>
+          </a:lstStyle>
+          <a:p>
+            <a:pPr lvl="0"/>
+            <a:r>
+              <a:rPr lang="zh-CN" altLang="en-US" smtClean="0"/>
+              <a:t>单击此处编辑母版文本样式</a:t>
+            </a:r>
+          </a:p>
+        </p:txBody>
+      </p:sp>
+      <p:sp>
+        <p:nvSpPr>
+          <p:cNvPr id="10" name="Text Placeholder 3"/>
+          <p:cNvSpPr>
+            <a:spLocks noGrp="1"/>
+          </p:cNvSpPr>
+          <p:nvPr>
+            <p:ph type="body" sz="half" idx="16"/>
+          </p:nvPr>
+        </p:nvSpPr>
+        <p:spPr>
+          <a:xfrm>
+            <a:off x="3300781" y="2904068"/>
+            <a:ext cx="2560320" cy="3359572"/>
+          </a:xfrm>
+        </p:spPr>
+        <p:txBody>
+          <a:bodyPr anchor="t">
+            <a:normAutofit/>
+          </a:bodyPr>
+          <a:lstStyle>
+            <a:lvl1pPr marL="0" indent="0">
+              <a:buNone/>
+              <a:defRPr sz="1400"/>
+            </a:lvl1pPr>
+            <a:lvl2pPr marL="457200" indent="0">
+              <a:buNone/>
+              <a:defRPr sz="1200"/>
+            </a:lvl2pPr>
+            <a:lvl3pPr marL="914400" indent="0">
+              <a:buNone/>
+              <a:defRPr sz="1000"/>
+            </a:lvl3pPr>
+            <a:lvl4pPr marL="1371600" indent="0">
+              <a:buNone/>
+              <a:defRPr sz="900"/>
+            </a:lvl4pPr>
+            <a:lvl5pPr marL="1828800" indent="0">
+              <a:buNone/>
+              <a:defRPr sz="900"/>
+            </a:lvl5pPr>
+            <a:lvl6pPr marL="2286000" indent="0">
+              <a:buNone/>
+              <a:defRPr sz="900"/>
+            </a:lvl6pPr>
+            <a:lvl7pPr marL="2743200" indent="0">
+              <a:buNone/>
+              <a:defRPr sz="900"/>
+            </a:lvl7pPr>
+            <a:lvl8pPr marL="3200400" indent="0">
+              <a:buNone/>
+              <a:defRPr sz="900"/>
+            </a:lvl8pPr>
+            <a:lvl9pPr marL="3657600" indent="0">
+              <a:buNone/>
+              <a:defRPr sz="900"/>
+            </a:lvl9pPr>
+          </a:lstStyle>
+          <a:p>
+            <a:pPr lvl="0"/>
+            <a:r>
+              <a:rPr lang="zh-CN" altLang="en-US" smtClean="0"/>
+              <a:t>单击此处编辑母版文本样式</a:t>
+            </a:r>
+          </a:p>
+        </p:txBody>
+      </p:sp>
+      <p:sp>
+        <p:nvSpPr>
+          <p:cNvPr id="11" name="Text Placeholder 4"/>
+          <p:cNvSpPr>
+            <a:spLocks noGrp="1"/>
+          </p:cNvSpPr>
+          <p:nvPr>
+            <p:ph type="body" sz="quarter" idx="13"/>
+          </p:nvPr>
+        </p:nvSpPr>
+        <p:spPr>
+          <a:xfrm>
+            <a:off x="5989319" y="2192866"/>
+            <a:ext cx="2560320" cy="626534"/>
+          </a:xfrm>
+        </p:spPr>
+        <p:txBody>
+          <a:bodyPr anchor="b">
+            <a:noAutofit/>
+          </a:bodyPr>
+          <a:lstStyle>
+            <a:lvl1pPr marL="0" indent="0">
+              <a:buNone/>
+              <a:defRPr sz="2400" b="0">
+                <a:solidFill>
+                  <a:schemeClr val="tx1"/>
+                </a:solidFill>
+              </a:defRPr>
+            </a:lvl1pPr>
+            <a:lvl2pPr marL="457200" indent="0">
+              <a:buNone/>
+              <a:defRPr sz="2000" b="1"/>
+            </a:lvl2pPr>
+            <a:lvl3pPr marL="914400" indent="0">
+              <a:buNone/>
+              <a:defRPr sz="1800" b="1"/>
+            </a:lvl3pPr>
+            <a:lvl4pPr marL="1371600" indent="0">
+              <a:buNone/>
+              <a:defRPr sz="1600" b="1"/>
+            </a:lvl4pPr>
+            <a:lvl5pPr marL="1828800" indent="0">
+              <a:buNone/>
+              <a:defRPr sz="1600" b="1"/>
+            </a:lvl5pPr>
+            <a:lvl6pPr marL="2286000" indent="0">
+              <a:buNone/>
+              <a:defRPr sz="1600" b="1"/>
+            </a:lvl6pPr>
+            <a:lvl7pPr marL="2743200" indent="0">
+              <a:buNone/>
+              <a:defRPr sz="1600" b="1"/>
+            </a:lvl7pPr>
+            <a:lvl8pPr marL="3200400" indent="0">
+              <a:buNone/>
+              <a:defRPr sz="1600" b="1"/>
+            </a:lvl8pPr>
+            <a:lvl9pPr marL="3657600" indent="0">
+              <a:buNone/>
+              <a:defRPr sz="1600" b="1"/>
+            </a:lvl9pPr>
+          </a:lstStyle>
+          <a:p>
+            <a:pPr lvl="0"/>
+            <a:r>
+              <a:rPr lang="zh-CN" altLang="en-US" smtClean="0"/>
+              <a:t>单击此处编辑母版文本样式</a:t>
+            </a:r>
+          </a:p>
+        </p:txBody>
+      </p:sp>
+      <p:sp>
+        <p:nvSpPr>
+          <p:cNvPr id="12" name="Text Placeholder 3"/>
+          <p:cNvSpPr>
+            <a:spLocks noGrp="1"/>
+          </p:cNvSpPr>
+          <p:nvPr>
+            <p:ph type="body" sz="half" idx="17"/>
+          </p:nvPr>
+        </p:nvSpPr>
+        <p:spPr>
+          <a:xfrm>
+            <a:off x="5989320" y="2904564"/>
+            <a:ext cx="2560320" cy="3359079"/>
+          </a:xfrm>
+        </p:spPr>
+        <p:txBody>
+          <a:bodyPr anchor="t">
+            <a:normAutofit/>
+          </a:bodyPr>
+          <a:lstStyle>
+            <a:lvl1pPr marL="0" indent="0">
+              <a:buNone/>
+              <a:defRPr sz="1400"/>
+            </a:lvl1pPr>
+            <a:lvl2pPr marL="457200" indent="0">
+              <a:buNone/>
+              <a:defRPr sz="1200"/>
+            </a:lvl2pPr>
+            <a:lvl3pPr marL="914400" indent="0">
+              <a:buNone/>
+              <a:defRPr sz="1000"/>
+            </a:lvl3pPr>
+            <a:lvl4pPr marL="1371600" indent="0">
+              <a:buNone/>
+              <a:defRPr sz="900"/>
+            </a:lvl4pPr>
+            <a:lvl5pPr marL="1828800" indent="0">
+              <a:buNone/>
+              <a:defRPr sz="900"/>
+            </a:lvl5pPr>
+            <a:lvl6pPr marL="2286000" indent="0">
+              <a:buNone/>
+              <a:defRPr sz="900"/>
+            </a:lvl6pPr>
+            <a:lvl7pPr marL="2743200" indent="0">
+              <a:buNone/>
+              <a:defRPr sz="900"/>
+            </a:lvl7pPr>
+            <a:lvl8pPr marL="3200400" indent="0">
+              <a:buNone/>
+              <a:defRPr sz="900"/>
+            </a:lvl8pPr>
+            <a:lvl9pPr marL="3657600" indent="0">
+              <a:buNone/>
+              <a:defRPr sz="900"/>
+            </a:lvl9pPr>
+          </a:lstStyle>
+          <a:p>
+            <a:pPr lvl="0"/>
+            <a:r>
+              <a:rPr lang="zh-CN" altLang="en-US" smtClean="0"/>
+              <a:t>单击此处编辑母版文本样式</a:t>
+            </a:r>
+          </a:p>
+        </p:txBody>
+      </p:sp>
+      <p:sp>
+        <p:nvSpPr>
+          <p:cNvPr id="3" name="Date Placeholder 2"/>
+          <p:cNvSpPr>
+            <a:spLocks noGrp="1"/>
+          </p:cNvSpPr>
+          <p:nvPr>
+            <p:ph type="dt" sz="half" idx="10"/>
+          </p:nvPr>
+        </p:nvSpPr>
+        <p:spPr/>
+        <p:txBody>
+          <a:bodyPr/>
+          <a:lstStyle/>
+          <a:p>
+            <a:fld id="{827F7EC9-FA32-8F41-831C-53EF8A8DB099}" type="datetime1">
+              <a:rPr kumimoji="1" lang="zh-CN" altLang="en-US" smtClean="0"/>
+              <a:t>2017/11/21</a:t>
+            </a:fld>
+            <a:endParaRPr kumimoji="1" lang="zh-CN" altLang="en-US"/>
+          </a:p>
+        </p:txBody>
+      </p:sp>
+      <p:sp>
+        <p:nvSpPr>
+          <p:cNvPr id="4" name="Footer Placeholder 3"/>
+          <p:cNvSpPr>
+            <a:spLocks noGrp="1"/>
+          </p:cNvSpPr>
+          <p:nvPr>
+            <p:ph type="ftr" sz="quarter" idx="11"/>
+          </p:nvPr>
+        </p:nvSpPr>
+        <p:spPr/>
+        <p:txBody>
+          <a:bodyPr/>
+          <a:lstStyle/>
+          <a:p>
+            <a:endParaRPr kumimoji="1" lang="zh-CN" altLang="en-US"/>
+          </a:p>
+        </p:txBody>
+      </p:sp>
+      <p:sp>
+        <p:nvSpPr>
+          <p:cNvPr id="5" name="Slide Number Placeholder 4"/>
+          <p:cNvSpPr>
+            <a:spLocks noGrp="1"/>
+          </p:cNvSpPr>
+          <p:nvPr>
+            <p:ph type="sldNum" sz="quarter" idx="12"/>
+          </p:nvPr>
+        </p:nvSpPr>
+        <p:spPr/>
+        <p:txBody>
+          <a:bodyPr/>
+          <a:lstStyle/>
+          <a:p>
+            <a:fld id="{12924E00-6951-2E4A-9B91-938056433B77}" type="slidenum">
+              <a:rPr kumimoji="1" lang="zh-CN" altLang="en-US" smtClean="0"/>
+              <a:t>‹#›</a:t>
+            </a:fld>
+            <a:endParaRPr kumimoji="1" lang="zh-CN" altLang="en-US"/>
+          </a:p>
+        </p:txBody>
+      </p:sp>
+    </p:spTree>
+  </p:cSld>
+  <p:clrMapOvr>
+    <a:masterClrMapping/>
+  </p:clrMapOvr>
+  <p:hf hdr="0" ftr="0"/>
+</p:sldLayout>
+</file>
+
+<file path=ppt/slideLayouts/slideLayout15.xml><?xml version="1.0" encoding="utf-8"?>
+<p:sldLayout xmlns:a="http://schemas.openxmlformats.org/drawingml/2006/main" xmlns:r="http://schemas.openxmlformats.org/officeDocument/2006/relationships" xmlns:p="http://schemas.openxmlformats.org/presentationml/2006/main" preserve="1">
+  <p:cSld name="三栏图片">
+    <p:spTree>
+      <p:nvGrpSpPr>
+        <p:cNvPr id="1" name=""/>
+        <p:cNvGrpSpPr/>
+        <p:nvPr/>
+      </p:nvGrpSpPr>
+      <p:grpSpPr>
+        <a:xfrm>
+          <a:off x="0" y="0"/>
+          <a:ext cx="0" cy="0"/>
+          <a:chOff x="0" y="0"/>
+          <a:chExt cx="0" cy="0"/>
+        </a:xfrm>
+      </p:grpSpPr>
+      <p:sp>
+        <p:nvSpPr>
+          <p:cNvPr id="30" name="Title 1"/>
+          <p:cNvSpPr>
+            <a:spLocks noGrp="1"/>
+          </p:cNvSpPr>
+          <p:nvPr>
+            <p:ph type="title"/>
+          </p:nvPr>
+        </p:nvSpPr>
+        <p:spPr>
+          <a:xfrm>
+            <a:off x="2171702" y="762000"/>
+            <a:ext cx="6381984" cy="1295400"/>
+          </a:xfrm>
+        </p:spPr>
+        <p:txBody>
+          <a:bodyPr/>
+          <a:lstStyle/>
+          <a:p>
+            <a:r>
+              <a:rPr lang="zh-CN" altLang="en-US" smtClean="0"/>
+              <a:t>单击此处编辑母版标题样式</a:t>
+            </a:r>
+            <a:endParaRPr lang="en-US" dirty="0"/>
+          </a:p>
+        </p:txBody>
+      </p:sp>
+      <p:sp>
+        <p:nvSpPr>
+          <p:cNvPr id="19" name="Text Placeholder 2"/>
+          <p:cNvSpPr>
+            <a:spLocks noGrp="1"/>
+          </p:cNvSpPr>
+          <p:nvPr>
+            <p:ph type="body" idx="1"/>
+          </p:nvPr>
+        </p:nvSpPr>
+        <p:spPr>
+          <a:xfrm>
+            <a:off x="594360" y="4113340"/>
+            <a:ext cx="2560320" cy="682765"/>
+          </a:xfrm>
+        </p:spPr>
+        <p:txBody>
+          <a:bodyPr anchor="b">
+            <a:noAutofit/>
+          </a:bodyPr>
+          <a:lstStyle>
+            <a:lvl1pPr marL="0" indent="0">
+              <a:buNone/>
+              <a:defRPr sz="2400" b="0">
+                <a:solidFill>
+                  <a:schemeClr val="tx1"/>
+                </a:solidFill>
+              </a:defRPr>
+            </a:lvl1pPr>
+            <a:lvl2pPr marL="457200" indent="0">
+              <a:buNone/>
+              <a:defRPr sz="2000" b="1"/>
+            </a:lvl2pPr>
+            <a:lvl3pPr marL="914400" indent="0">
+              <a:buNone/>
+              <a:defRPr sz="1800" b="1"/>
+            </a:lvl3pPr>
+            <a:lvl4pPr marL="1371600" indent="0">
+              <a:buNone/>
+              <a:defRPr sz="1600" b="1"/>
+            </a:lvl4pPr>
+            <a:lvl5pPr marL="1828800" indent="0">
+              <a:buNone/>
+              <a:defRPr sz="1600" b="1"/>
+            </a:lvl5pPr>
+            <a:lvl6pPr marL="2286000" indent="0">
+              <a:buNone/>
+              <a:defRPr sz="1600" b="1"/>
+            </a:lvl6pPr>
+            <a:lvl7pPr marL="2743200" indent="0">
+              <a:buNone/>
+              <a:defRPr sz="1600" b="1"/>
+            </a:lvl7pPr>
+            <a:lvl8pPr marL="3200400" indent="0">
+              <a:buNone/>
+              <a:defRPr sz="1600" b="1"/>
+            </a:lvl8pPr>
+            <a:lvl9pPr marL="3657600" indent="0">
+              <a:buNone/>
+              <a:defRPr sz="1600" b="1"/>
+            </a:lvl9pPr>
+          </a:lstStyle>
+          <a:p>
+            <a:pPr lvl="0"/>
+            <a:r>
+              <a:rPr lang="zh-CN" altLang="en-US" smtClean="0"/>
+              <a:t>单击此处编辑母版文本样式</a:t>
+            </a:r>
+          </a:p>
+        </p:txBody>
+      </p:sp>
+      <p:sp>
+        <p:nvSpPr>
+          <p:cNvPr id="20" name="Picture Placeholder 2"/>
+          <p:cNvSpPr>
+            <a:spLocks noGrp="1" noChangeAspect="1"/>
+          </p:cNvSpPr>
+          <p:nvPr>
+            <p:ph type="pic" idx="15"/>
+          </p:nvPr>
+        </p:nvSpPr>
+        <p:spPr>
+          <a:xfrm>
+            <a:off x="594360" y="2331720"/>
+            <a:ext cx="2560320" cy="1507300"/>
+          </a:xfrm>
+          <a:prstGeom prst="roundRect">
+            <a:avLst>
+              <a:gd name="adj" fmla="val 0"/>
+            </a:avLst>
+          </a:prstGeom>
+          <a:effectLst>
+            <a:outerShdw blurRad="50800" dist="50800" dir="5400000" algn="tl" rotWithShape="0">
+              <a:srgbClr val="000000">
+                <a:alpha val="43000"/>
+              </a:srgbClr>
+            </a:outerShdw>
+          </a:effectLst>
+        </p:spPr>
+        <p:txBody>
+          <a:bodyPr anchor="t">
+            <a:normAutofit/>
+          </a:bodyPr>
+          <a:lstStyle>
+            <a:lvl1pPr marL="0" indent="0" algn="ctr">
+              <a:buNone/>
+              <a:defRPr sz="1600"/>
+            </a:lvl1pPr>
+            <a:lvl2pPr marL="457200" indent="0">
+              <a:buNone/>
+              <a:defRPr sz="1600"/>
+            </a:lvl2pPr>
+            <a:lvl3pPr marL="914400" indent="0">
+              <a:buNone/>
+              <a:defRPr sz="1600"/>
+            </a:lvl3pPr>
+            <a:lvl4pPr marL="1371600" indent="0">
+              <a:buNone/>
+              <a:defRPr sz="1600"/>
+            </a:lvl4pPr>
+            <a:lvl5pPr marL="1828800" indent="0">
+              <a:buNone/>
+              <a:defRPr sz="1600"/>
+            </a:lvl5pPr>
+            <a:lvl6pPr marL="2286000" indent="0">
+              <a:buNone/>
+              <a:defRPr sz="1600"/>
+            </a:lvl6pPr>
+            <a:lvl7pPr marL="2743200" indent="0">
+              <a:buNone/>
+              <a:defRPr sz="1600"/>
+            </a:lvl7pPr>
+            <a:lvl8pPr marL="3200400" indent="0">
+              <a:buNone/>
+              <a:defRPr sz="1600"/>
+            </a:lvl8pPr>
+            <a:lvl9pPr marL="3657600" indent="0">
+              <a:buNone/>
+              <a:defRPr sz="1600"/>
+            </a:lvl9pPr>
+          </a:lstStyle>
+          <a:p>
+            <a:r>
+              <a:rPr lang="zh-CN" altLang="en-US" smtClean="0"/>
+              <a:t>将图片拖动到占位符，或单击添加图标</a:t>
+            </a:r>
+            <a:endParaRPr lang="en-US" dirty="0"/>
+          </a:p>
+        </p:txBody>
+      </p:sp>
+      <p:sp>
+        <p:nvSpPr>
+          <p:cNvPr id="21" name="Text Placeholder 3"/>
+          <p:cNvSpPr>
+            <a:spLocks noGrp="1"/>
+          </p:cNvSpPr>
+          <p:nvPr>
+            <p:ph type="body" sz="half" idx="18"/>
+          </p:nvPr>
+        </p:nvSpPr>
+        <p:spPr>
+          <a:xfrm>
+            <a:off x="594360" y="4796103"/>
+            <a:ext cx="2560320" cy="1467537"/>
+          </a:xfrm>
+        </p:spPr>
+        <p:txBody>
+          <a:bodyPr anchor="t">
+            <a:normAutofit/>
+          </a:bodyPr>
+          <a:lstStyle>
+            <a:lvl1pPr marL="0" indent="0">
+              <a:buNone/>
+              <a:defRPr sz="1400"/>
+            </a:lvl1pPr>
+            <a:lvl2pPr marL="457200" indent="0">
+              <a:buNone/>
+              <a:defRPr sz="1200"/>
+            </a:lvl2pPr>
+            <a:lvl3pPr marL="914400" indent="0">
+              <a:buNone/>
+              <a:defRPr sz="1000"/>
+            </a:lvl3pPr>
+            <a:lvl4pPr marL="1371600" indent="0">
+              <a:buNone/>
+              <a:defRPr sz="900"/>
+            </a:lvl4pPr>
+            <a:lvl5pPr marL="1828800" indent="0">
+              <a:buNone/>
+              <a:defRPr sz="900"/>
+            </a:lvl5pPr>
+            <a:lvl6pPr marL="2286000" indent="0">
+              <a:buNone/>
+              <a:defRPr sz="900"/>
+            </a:lvl6pPr>
+            <a:lvl7pPr marL="2743200" indent="0">
+              <a:buNone/>
+              <a:defRPr sz="900"/>
+            </a:lvl7pPr>
+            <a:lvl8pPr marL="3200400" indent="0">
+              <a:buNone/>
+              <a:defRPr sz="900"/>
+            </a:lvl8pPr>
+            <a:lvl9pPr marL="3657600" indent="0">
+              <a:buNone/>
+              <a:defRPr sz="900"/>
+            </a:lvl9pPr>
+          </a:lstStyle>
+          <a:p>
+            <a:pPr lvl="0"/>
+            <a:r>
+              <a:rPr lang="zh-CN" altLang="en-US" smtClean="0"/>
+              <a:t>单击此处编辑母版文本样式</a:t>
+            </a:r>
+          </a:p>
+        </p:txBody>
+      </p:sp>
+      <p:sp>
+        <p:nvSpPr>
+          <p:cNvPr id="22" name="Text Placeholder 4"/>
+          <p:cNvSpPr>
+            <a:spLocks noGrp="1"/>
+          </p:cNvSpPr>
+          <p:nvPr>
+            <p:ph type="body" sz="quarter" idx="3"/>
+          </p:nvPr>
+        </p:nvSpPr>
+        <p:spPr>
+          <a:xfrm>
+            <a:off x="3291873" y="4113340"/>
+            <a:ext cx="2560320" cy="682765"/>
+          </a:xfrm>
+        </p:spPr>
+        <p:txBody>
+          <a:bodyPr anchor="b">
+            <a:noAutofit/>
+          </a:bodyPr>
+          <a:lstStyle>
+            <a:lvl1pPr marL="0" indent="0">
+              <a:buNone/>
+              <a:defRPr sz="2400" b="0">
+                <a:solidFill>
+                  <a:schemeClr val="tx1"/>
+                </a:solidFill>
+              </a:defRPr>
+            </a:lvl1pPr>
+            <a:lvl2pPr marL="457200" indent="0">
+              <a:buNone/>
+              <a:defRPr sz="2000" b="1"/>
+            </a:lvl2pPr>
+            <a:lvl3pPr marL="914400" indent="0">
+              <a:buNone/>
+              <a:defRPr sz="1800" b="1"/>
+            </a:lvl3pPr>
+            <a:lvl4pPr marL="1371600" indent="0">
+              <a:buNone/>
+              <a:defRPr sz="1600" b="1"/>
+            </a:lvl4pPr>
+            <a:lvl5pPr marL="1828800" indent="0">
+              <a:buNone/>
+              <a:defRPr sz="1600" b="1"/>
+            </a:lvl5pPr>
+            <a:lvl6pPr marL="2286000" indent="0">
+              <a:buNone/>
+              <a:defRPr sz="1600" b="1"/>
+            </a:lvl6pPr>
+            <a:lvl7pPr marL="2743200" indent="0">
+              <a:buNone/>
+              <a:defRPr sz="1600" b="1"/>
+            </a:lvl7pPr>
+            <a:lvl8pPr marL="3200400" indent="0">
+              <a:buNone/>
+              <a:defRPr sz="1600" b="1"/>
+            </a:lvl8pPr>
+            <a:lvl9pPr marL="3657600" indent="0">
+              <a:buNone/>
+              <a:defRPr sz="1600" b="1"/>
+            </a:lvl9pPr>
+          </a:lstStyle>
+          <a:p>
+            <a:pPr lvl="0"/>
+            <a:r>
+              <a:rPr lang="zh-CN" altLang="en-US" smtClean="0"/>
+              <a:t>单击此处编辑母版文本样式</a:t>
+            </a:r>
+          </a:p>
+        </p:txBody>
+      </p:sp>
+      <p:sp>
+        <p:nvSpPr>
+          <p:cNvPr id="23" name="Picture Placeholder 2"/>
+          <p:cNvSpPr>
+            <a:spLocks noGrp="1" noChangeAspect="1"/>
+          </p:cNvSpPr>
+          <p:nvPr>
+            <p:ph type="pic" idx="21"/>
+          </p:nvPr>
+        </p:nvSpPr>
+        <p:spPr>
+          <a:xfrm>
+            <a:off x="3291872" y="2331720"/>
+            <a:ext cx="2560320" cy="1509862"/>
+          </a:xfrm>
+          <a:prstGeom prst="roundRect">
+            <a:avLst>
+              <a:gd name="adj" fmla="val 0"/>
+            </a:avLst>
+          </a:prstGeom>
+          <a:effectLst>
+            <a:outerShdw blurRad="50800" dist="50800" dir="5400000" algn="tl" rotWithShape="0">
+              <a:srgbClr val="000000">
+                <a:alpha val="43000"/>
+              </a:srgbClr>
+            </a:outerShdw>
+          </a:effectLst>
+        </p:spPr>
+        <p:txBody>
+          <a:bodyPr anchor="t">
+            <a:normAutofit/>
+          </a:bodyPr>
+          <a:lstStyle>
+            <a:lvl1pPr marL="0" indent="0" algn="ctr">
+              <a:buNone/>
+              <a:defRPr sz="1600"/>
+            </a:lvl1pPr>
+            <a:lvl2pPr marL="457200" indent="0">
+              <a:buNone/>
+              <a:defRPr sz="1600"/>
+            </a:lvl2pPr>
+            <a:lvl3pPr marL="914400" indent="0">
+              <a:buNone/>
+              <a:defRPr sz="1600"/>
+            </a:lvl3pPr>
+            <a:lvl4pPr marL="1371600" indent="0">
+              <a:buNone/>
+              <a:defRPr sz="1600"/>
+            </a:lvl4pPr>
+            <a:lvl5pPr marL="1828800" indent="0">
+              <a:buNone/>
+              <a:defRPr sz="1600"/>
+            </a:lvl5pPr>
+            <a:lvl6pPr marL="2286000" indent="0">
+              <a:buNone/>
+              <a:defRPr sz="1600"/>
+            </a:lvl6pPr>
+            <a:lvl7pPr marL="2743200" indent="0">
+              <a:buNone/>
+              <a:defRPr sz="1600"/>
+            </a:lvl7pPr>
+            <a:lvl8pPr marL="3200400" indent="0">
+              <a:buNone/>
+              <a:defRPr sz="1600"/>
+            </a:lvl8pPr>
+            <a:lvl9pPr marL="3657600" indent="0">
+              <a:buNone/>
+              <a:defRPr sz="1600"/>
+            </a:lvl9pPr>
+          </a:lstStyle>
+          <a:p>
+            <a:r>
+              <a:rPr lang="zh-CN" altLang="en-US" smtClean="0"/>
+              <a:t>将图片拖动到占位符，或单击添加图标</a:t>
+            </a:r>
+            <a:endParaRPr lang="en-US" dirty="0"/>
+          </a:p>
+        </p:txBody>
+      </p:sp>
+      <p:sp>
+        <p:nvSpPr>
+          <p:cNvPr id="24" name="Text Placeholder 3"/>
+          <p:cNvSpPr>
+            <a:spLocks noGrp="1"/>
+          </p:cNvSpPr>
+          <p:nvPr>
+            <p:ph type="body" sz="half" idx="19"/>
+          </p:nvPr>
+        </p:nvSpPr>
+        <p:spPr>
+          <a:xfrm>
+            <a:off x="3290858" y="4796102"/>
+            <a:ext cx="2560320" cy="1467537"/>
+          </a:xfrm>
+        </p:spPr>
+        <p:txBody>
+          <a:bodyPr anchor="t">
+            <a:normAutofit/>
+          </a:bodyPr>
+          <a:lstStyle>
+            <a:lvl1pPr marL="0" indent="0">
+              <a:buNone/>
+              <a:defRPr sz="1400"/>
+            </a:lvl1pPr>
+            <a:lvl2pPr marL="457200" indent="0">
+              <a:buNone/>
+              <a:defRPr sz="1200"/>
+            </a:lvl2pPr>
+            <a:lvl3pPr marL="914400" indent="0">
+              <a:buNone/>
+              <a:defRPr sz="1000"/>
+            </a:lvl3pPr>
+            <a:lvl4pPr marL="1371600" indent="0">
+              <a:buNone/>
+              <a:defRPr sz="900"/>
+            </a:lvl4pPr>
+            <a:lvl5pPr marL="1828800" indent="0">
+              <a:buNone/>
+              <a:defRPr sz="900"/>
+            </a:lvl5pPr>
+            <a:lvl6pPr marL="2286000" indent="0">
+              <a:buNone/>
+              <a:defRPr sz="900"/>
+            </a:lvl6pPr>
+            <a:lvl7pPr marL="2743200" indent="0">
+              <a:buNone/>
+              <a:defRPr sz="900"/>
+            </a:lvl7pPr>
+            <a:lvl8pPr marL="3200400" indent="0">
+              <a:buNone/>
+              <a:defRPr sz="900"/>
+            </a:lvl8pPr>
+            <a:lvl9pPr marL="3657600" indent="0">
+              <a:buNone/>
+              <a:defRPr sz="900"/>
+            </a:lvl9pPr>
+          </a:lstStyle>
+          <a:p>
+            <a:pPr lvl="0"/>
+            <a:r>
+              <a:rPr lang="zh-CN" altLang="en-US" smtClean="0"/>
+              <a:t>单击此处编辑母版文本样式</a:t>
+            </a:r>
+          </a:p>
+        </p:txBody>
+      </p:sp>
+      <p:sp>
+        <p:nvSpPr>
+          <p:cNvPr id="25" name="Text Placeholder 4"/>
+          <p:cNvSpPr>
+            <a:spLocks noGrp="1"/>
+          </p:cNvSpPr>
+          <p:nvPr>
+            <p:ph type="body" sz="quarter" idx="13"/>
+          </p:nvPr>
+        </p:nvSpPr>
+        <p:spPr>
+          <a:xfrm>
+            <a:off x="5993365" y="4113340"/>
+            <a:ext cx="2560320" cy="682765"/>
+          </a:xfrm>
+        </p:spPr>
+        <p:txBody>
+          <a:bodyPr anchor="b">
+            <a:noAutofit/>
+          </a:bodyPr>
+          <a:lstStyle>
+            <a:lvl1pPr marL="0" indent="0">
+              <a:buNone/>
+              <a:defRPr sz="2400" b="0">
+                <a:solidFill>
+                  <a:schemeClr val="tx1"/>
+                </a:solidFill>
+              </a:defRPr>
+            </a:lvl1pPr>
+            <a:lvl2pPr marL="457200" indent="0">
+              <a:buNone/>
+              <a:defRPr sz="2000" b="1"/>
+            </a:lvl2pPr>
+            <a:lvl3pPr marL="914400" indent="0">
+              <a:buNone/>
+              <a:defRPr sz="1800" b="1"/>
+            </a:lvl3pPr>
+            <a:lvl4pPr marL="1371600" indent="0">
+              <a:buNone/>
+              <a:defRPr sz="1600" b="1"/>
+            </a:lvl4pPr>
+            <a:lvl5pPr marL="1828800" indent="0">
+              <a:buNone/>
+              <a:defRPr sz="1600" b="1"/>
+            </a:lvl5pPr>
+            <a:lvl6pPr marL="2286000" indent="0">
+              <a:buNone/>
+              <a:defRPr sz="1600" b="1"/>
+            </a:lvl6pPr>
+            <a:lvl7pPr marL="2743200" indent="0">
+              <a:buNone/>
+              <a:defRPr sz="1600" b="1"/>
+            </a:lvl7pPr>
+            <a:lvl8pPr marL="3200400" indent="0">
+              <a:buNone/>
+              <a:defRPr sz="1600" b="1"/>
+            </a:lvl8pPr>
+            <a:lvl9pPr marL="3657600" indent="0">
+              <a:buNone/>
+              <a:defRPr sz="1600" b="1"/>
+            </a:lvl9pPr>
+          </a:lstStyle>
+          <a:p>
+            <a:pPr lvl="0"/>
+            <a:r>
+              <a:rPr lang="zh-CN" altLang="en-US" smtClean="0"/>
+              <a:t>单击此处编辑母版文本样式</a:t>
+            </a:r>
+          </a:p>
+        </p:txBody>
+      </p:sp>
+      <p:sp>
+        <p:nvSpPr>
+          <p:cNvPr id="26" name="Picture Placeholder 2"/>
+          <p:cNvSpPr>
+            <a:spLocks noGrp="1" noChangeAspect="1"/>
+          </p:cNvSpPr>
+          <p:nvPr>
+            <p:ph type="pic" idx="22"/>
+          </p:nvPr>
+        </p:nvSpPr>
+        <p:spPr>
+          <a:xfrm>
+            <a:off x="5993364" y="2331721"/>
+            <a:ext cx="2560320" cy="1508919"/>
+          </a:xfrm>
+          <a:prstGeom prst="roundRect">
+            <a:avLst>
+              <a:gd name="adj" fmla="val 0"/>
+            </a:avLst>
+          </a:prstGeom>
+          <a:effectLst>
+            <a:outerShdw blurRad="50800" dist="50800" dir="5400000" algn="tl" rotWithShape="0">
+              <a:srgbClr val="000000">
+                <a:alpha val="43000"/>
+              </a:srgbClr>
+            </a:outerShdw>
+          </a:effectLst>
+        </p:spPr>
+        <p:txBody>
+          <a:bodyPr anchor="t">
+            <a:normAutofit/>
+          </a:bodyPr>
+          <a:lstStyle>
+            <a:lvl1pPr marL="0" indent="0" algn="ctr">
+              <a:buNone/>
+              <a:defRPr sz="1600"/>
+            </a:lvl1pPr>
+            <a:lvl2pPr marL="457200" indent="0">
+              <a:buNone/>
+              <a:defRPr sz="1600"/>
+            </a:lvl2pPr>
+            <a:lvl3pPr marL="914400" indent="0">
+              <a:buNone/>
+              <a:defRPr sz="1600"/>
+            </a:lvl3pPr>
+            <a:lvl4pPr marL="1371600" indent="0">
+              <a:buNone/>
+              <a:defRPr sz="1600"/>
+            </a:lvl4pPr>
+            <a:lvl5pPr marL="1828800" indent="0">
+              <a:buNone/>
+              <a:defRPr sz="1600"/>
+            </a:lvl5pPr>
+            <a:lvl6pPr marL="2286000" indent="0">
+              <a:buNone/>
+              <a:defRPr sz="1600"/>
+            </a:lvl6pPr>
+            <a:lvl7pPr marL="2743200" indent="0">
+              <a:buNone/>
+              <a:defRPr sz="1600"/>
+            </a:lvl7pPr>
+            <a:lvl8pPr marL="3200400" indent="0">
+              <a:buNone/>
+              <a:defRPr sz="1600"/>
+            </a:lvl8pPr>
+            <a:lvl9pPr marL="3657600" indent="0">
+              <a:buNone/>
+              <a:defRPr sz="1600"/>
+            </a:lvl9pPr>
+          </a:lstStyle>
+          <a:p>
+            <a:r>
+              <a:rPr lang="zh-CN" altLang="en-US" smtClean="0"/>
+              <a:t>将图片拖动到占位符，或单击添加图标</a:t>
+            </a:r>
+            <a:endParaRPr lang="en-US" dirty="0"/>
+          </a:p>
+        </p:txBody>
+      </p:sp>
+      <p:sp>
+        <p:nvSpPr>
+          <p:cNvPr id="27" name="Text Placeholder 3"/>
+          <p:cNvSpPr>
+            <a:spLocks noGrp="1"/>
+          </p:cNvSpPr>
+          <p:nvPr>
+            <p:ph type="body" sz="half" idx="20"/>
+          </p:nvPr>
+        </p:nvSpPr>
+        <p:spPr>
+          <a:xfrm>
+            <a:off x="5993272" y="4796100"/>
+            <a:ext cx="2560320" cy="1467537"/>
+          </a:xfrm>
+        </p:spPr>
+        <p:txBody>
+          <a:bodyPr anchor="t">
+            <a:normAutofit/>
+          </a:bodyPr>
+          <a:lstStyle>
+            <a:lvl1pPr marL="0" indent="0">
+              <a:buNone/>
+              <a:defRPr sz="1400"/>
+            </a:lvl1pPr>
+            <a:lvl2pPr marL="457200" indent="0">
+              <a:buNone/>
+              <a:defRPr sz="1200"/>
+            </a:lvl2pPr>
+            <a:lvl3pPr marL="914400" indent="0">
+              <a:buNone/>
+              <a:defRPr sz="1000"/>
+            </a:lvl3pPr>
+            <a:lvl4pPr marL="1371600" indent="0">
+              <a:buNone/>
+              <a:defRPr sz="900"/>
+            </a:lvl4pPr>
+            <a:lvl5pPr marL="1828800" indent="0">
+              <a:buNone/>
+              <a:defRPr sz="900"/>
+            </a:lvl5pPr>
+            <a:lvl6pPr marL="2286000" indent="0">
+              <a:buNone/>
+              <a:defRPr sz="900"/>
+            </a:lvl6pPr>
+            <a:lvl7pPr marL="2743200" indent="0">
+              <a:buNone/>
+              <a:defRPr sz="900"/>
+            </a:lvl7pPr>
+            <a:lvl8pPr marL="3200400" indent="0">
+              <a:buNone/>
+              <a:defRPr sz="900"/>
+            </a:lvl8pPr>
+            <a:lvl9pPr marL="3657600" indent="0">
+              <a:buNone/>
+              <a:defRPr sz="900"/>
+            </a:lvl9pPr>
+          </a:lstStyle>
+          <a:p>
+            <a:pPr lvl="0"/>
+            <a:r>
+              <a:rPr lang="zh-CN" altLang="en-US" smtClean="0"/>
+              <a:t>单击此处编辑母版文本样式</a:t>
+            </a:r>
+          </a:p>
+        </p:txBody>
+      </p:sp>
+      <p:sp>
+        <p:nvSpPr>
+          <p:cNvPr id="3" name="Date Placeholder 2"/>
+          <p:cNvSpPr>
+            <a:spLocks noGrp="1"/>
+          </p:cNvSpPr>
+          <p:nvPr>
+            <p:ph type="dt" sz="half" idx="10"/>
+          </p:nvPr>
+        </p:nvSpPr>
+        <p:spPr/>
+        <p:txBody>
+          <a:bodyPr/>
+          <a:lstStyle/>
+          <a:p>
+            <a:fld id="{827F7EC9-FA32-8F41-831C-53EF8A8DB099}" type="datetime1">
+              <a:rPr kumimoji="1" lang="zh-CN" altLang="en-US" smtClean="0"/>
+              <a:t>2017/11/21</a:t>
+            </a:fld>
+            <a:endParaRPr kumimoji="1" lang="zh-CN" altLang="en-US"/>
+          </a:p>
+        </p:txBody>
+      </p:sp>
+      <p:sp>
+        <p:nvSpPr>
+          <p:cNvPr id="4" name="Footer Placeholder 3"/>
+          <p:cNvSpPr>
+            <a:spLocks noGrp="1"/>
+          </p:cNvSpPr>
+          <p:nvPr>
+            <p:ph type="ftr" sz="quarter" idx="11"/>
+          </p:nvPr>
+        </p:nvSpPr>
+        <p:spPr/>
+        <p:txBody>
+          <a:bodyPr/>
+          <a:lstStyle/>
+          <a:p>
+            <a:endParaRPr kumimoji="1" lang="zh-CN" altLang="en-US"/>
+          </a:p>
+        </p:txBody>
+      </p:sp>
+      <p:sp>
+        <p:nvSpPr>
+          <p:cNvPr id="5" name="Slide Number Placeholder 4"/>
+          <p:cNvSpPr>
+            <a:spLocks noGrp="1"/>
+          </p:cNvSpPr>
+          <p:nvPr>
+            <p:ph type="sldNum" sz="quarter" idx="12"/>
+          </p:nvPr>
+        </p:nvSpPr>
+        <p:spPr/>
+        <p:txBody>
+          <a:bodyPr/>
+          <a:lstStyle/>
+          <a:p>
+            <a:fld id="{12924E00-6951-2E4A-9B91-938056433B77}" type="slidenum">
+              <a:rPr kumimoji="1" lang="zh-CN" altLang="en-US" smtClean="0"/>
+              <a:t>‹#›</a:t>
+            </a:fld>
+            <a:endParaRPr kumimoji="1" lang="zh-CN" altLang="en-US"/>
+          </a:p>
+        </p:txBody>
+      </p:sp>
+    </p:spTree>
+  </p:cSld>
+  <p:clrMapOvr>
+    <a:masterClrMapping/>
+  </p:clrMapOvr>
+  <p:hf hdr="0" ftr="0"/>
+</p:sldLayout>
+</file>
+
+<file path=ppt/slideLayouts/slideLayout16.xml><?xml version="1.0" encoding="utf-8"?>
 <p:sldLayout xmlns:a="http://schemas.openxmlformats.org/drawingml/2006/main" xmlns:r="http://schemas.openxmlformats.org/officeDocument/2006/relationships" xmlns:p="http://schemas.openxmlformats.org/presentationml/2006/main" type="vertTx" preserve="1">
   <p:cSld name="标题和竖排文本">
     <p:spTree>
@@ -782,7 +3399,12 @@
             <p:ph type="body" orient="vert" idx="1"/>
           </p:nvPr>
         </p:nvSpPr>
-        <p:spPr/>
+        <p:spPr>
+          <a:xfrm>
+            <a:off x="594360" y="2194560"/>
+            <a:ext cx="7955280" cy="4069080"/>
+          </a:xfrm>
+        </p:spPr>
         <p:txBody>
           <a:bodyPr vert="eaVert"/>
           <a:lstStyle/>
@@ -897,8 +3519,8 @@
 </p:sldLayout>
 </file>
 
-<file path=ppt/slideLayouts/slideLayout11.xml><?xml version="1.0" encoding="utf-8"?>
-<p:sldLayout xmlns:a="http://schemas.openxmlformats.org/drawingml/2006/main" xmlns:r="http://schemas.openxmlformats.org/officeDocument/2006/relationships" xmlns:p="http://schemas.openxmlformats.org/presentationml/2006/main" type="vertTitleAndTx" preserve="1">
+<file path=ppt/slideLayouts/slideLayout17.xml><?xml version="1.0" encoding="utf-8"?>
+<p:sldLayout xmlns:a="http://schemas.openxmlformats.org/drawingml/2006/main" xmlns:r="http://schemas.openxmlformats.org/officeDocument/2006/relationships" xmlns:p="http://schemas.openxmlformats.org/presentationml/2006/main" showMasterSp="0" type="vertTitleAndTx" preserve="1">
   <p:cSld name="竖排标题和文本">
     <p:spTree>
       <p:nvGrpSpPr>
@@ -914,6 +3536,36 @@
           <a:chExt cx="0" cy="0"/>
         </a:xfrm>
       </p:grpSpPr>
+      <p:pic>
+        <p:nvPicPr>
+          <p:cNvPr id="9" name="Picture 8" descr="C0-HD-BTM.png"/>
+          <p:cNvPicPr>
+            <a:picLocks noChangeAspect="1"/>
+          </p:cNvPicPr>
+          <p:nvPr/>
+        </p:nvPicPr>
+        <p:blipFill>
+          <a:blip r:embed="rId2">
+            <a:extLst>
+              <a:ext uri="{28A0092B-C50C-407E-A947-70E740481C1C}">
+                <a14:useLocalDpi xmlns:a14="http://schemas.microsoft.com/office/drawing/2010/main" val="0"/>
+              </a:ext>
+            </a:extLst>
+          </a:blip>
+          <a:stretch>
+            <a:fillRect/>
+          </a:stretch>
+        </p:blipFill>
+        <p:spPr>
+          <a:xfrm>
+            <a:off x="0" y="4995862"/>
+            <a:ext cx="9144000" cy="1862138"/>
+          </a:xfrm>
+          <a:prstGeom prst="rect">
+            <a:avLst/>
+          </a:prstGeom>
+        </p:spPr>
+      </p:pic>
       <p:sp>
         <p:nvSpPr>
           <p:cNvPr id="2" name="Vertical Title 1"/>
@@ -926,13 +3578,17 @@
         </p:nvSpPr>
         <p:spPr>
           <a:xfrm>
-            <a:off x="6543675" y="365125"/>
-            <a:ext cx="1971675" cy="5811838"/>
+            <a:off x="7006590" y="747183"/>
+            <a:ext cx="1543050" cy="4248675"/>
           </a:xfrm>
         </p:spPr>
         <p:txBody>
           <a:bodyPr vert="eaVert"/>
-          <a:lstStyle/>
+          <a:lstStyle>
+            <a:lvl1pPr algn="l">
+              <a:defRPr/>
+            </a:lvl1pPr>
+          </a:lstStyle>
           <a:p>
             <a:r>
               <a:rPr lang="zh-CN" altLang="en-US" smtClean="0"/>
@@ -954,8 +3610,8 @@
         </p:nvSpPr>
         <p:spPr>
           <a:xfrm>
-            <a:off x="628650" y="365125"/>
-            <a:ext cx="5800725" cy="5811838"/>
+            <a:off x="594360" y="746126"/>
+            <a:ext cx="6278035" cy="4249732"/>
           </a:xfrm>
         </p:spPr>
         <p:txBody>
@@ -1009,10 +3665,19 @@
             <p:ph type="dt" sz="half" idx="10"/>
           </p:nvPr>
         </p:nvSpPr>
-        <p:spPr/>
-        <p:txBody>
-          <a:bodyPr/>
-          <a:lstStyle/>
+        <p:spPr>
+          <a:xfrm>
+            <a:off x="5562176" y="381001"/>
+            <a:ext cx="2183130" cy="365125"/>
+          </a:xfrm>
+        </p:spPr>
+        <p:txBody>
+          <a:bodyPr/>
+          <a:lstStyle>
+            <a:lvl1pPr algn="r">
+              <a:defRPr/>
+            </a:lvl1pPr>
+          </a:lstStyle>
           <a:p>
             <a:fld id="{89E89219-512D-554F-9003-F40ADF720299}" type="datetime1">
               <a:rPr kumimoji="1" lang="zh-CN" altLang="en-US" smtClean="0"/>
@@ -1032,7 +3697,12 @@
             <p:ph type="ftr" sz="quarter" idx="11"/>
           </p:nvPr>
         </p:nvSpPr>
-        <p:spPr/>
+        <p:spPr>
+          <a:xfrm>
+            <a:off x="594360" y="381001"/>
+            <a:ext cx="4830656" cy="365125"/>
+          </a:xfrm>
+        </p:spPr>
         <p:txBody>
           <a:bodyPr/>
           <a:lstStyle/>
@@ -1051,7 +3721,12 @@
             <p:ph type="sldNum" sz="quarter" idx="12"/>
           </p:nvPr>
         </p:nvSpPr>
-        <p:spPr/>
+        <p:spPr>
+          <a:xfrm>
+            <a:off x="7882466" y="381001"/>
+            <a:ext cx="667174" cy="365125"/>
+          </a:xfrm>
+        </p:spPr>
         <p:txBody>
           <a:bodyPr/>
           <a:lstStyle/>
@@ -1238,7 +3913,7 @@
 </file>
 
 <file path=ppt/slideLayouts/slideLayout3.xml><?xml version="1.0" encoding="utf-8"?>
-<p:sldLayout xmlns:a="http://schemas.openxmlformats.org/drawingml/2006/main" xmlns:r="http://schemas.openxmlformats.org/officeDocument/2006/relationships" xmlns:p="http://schemas.openxmlformats.org/presentationml/2006/main" type="secHead" preserve="1">
+<p:sldLayout xmlns:a="http://schemas.openxmlformats.org/drawingml/2006/main" xmlns:r="http://schemas.openxmlformats.org/officeDocument/2006/relationships" xmlns:p="http://schemas.openxmlformats.org/presentationml/2006/main" showMasterSp="0" type="secHead" preserve="1">
   <p:cSld name="节标题">
     <p:spTree>
       <p:nvGrpSpPr>
@@ -1254,6 +3929,36 @@
           <a:chExt cx="0" cy="0"/>
         </a:xfrm>
       </p:grpSpPr>
+      <p:pic>
+        <p:nvPicPr>
+          <p:cNvPr id="8" name="Picture 7" descr="C0-HD-BTM.png"/>
+          <p:cNvPicPr>
+            <a:picLocks noChangeAspect="1"/>
+          </p:cNvPicPr>
+          <p:nvPr/>
+        </p:nvPicPr>
+        <p:blipFill>
+          <a:blip r:embed="rId2">
+            <a:extLst>
+              <a:ext uri="{28A0092B-C50C-407E-A947-70E740481C1C}">
+                <a14:useLocalDpi xmlns:a14="http://schemas.microsoft.com/office/drawing/2010/main" val="0"/>
+              </a:ext>
+            </a:extLst>
+          </a:blip>
+          <a:stretch>
+            <a:fillRect/>
+          </a:stretch>
+        </p:blipFill>
+        <p:spPr>
+          <a:xfrm>
+            <a:off x="0" y="4995862"/>
+            <a:ext cx="9144000" cy="1862138"/>
+          </a:xfrm>
+          <a:prstGeom prst="rect">
+            <a:avLst/>
+          </a:prstGeom>
+        </p:spPr>
+      </p:pic>
       <p:sp>
         <p:nvSpPr>
           <p:cNvPr id="2" name="Title 1"/>
@@ -1266,15 +3971,17 @@
         </p:nvSpPr>
         <p:spPr>
           <a:xfrm>
-            <a:off x="623888" y="1709739"/>
-            <a:ext cx="7886700" cy="2852737"/>
-          </a:xfrm>
-        </p:spPr>
-        <p:txBody>
-          <a:bodyPr anchor="b"/>
+            <a:off x="594360" y="753534"/>
+            <a:ext cx="7955280" cy="2801935"/>
+          </a:xfrm>
+        </p:spPr>
+        <p:txBody>
+          <a:bodyPr anchor="b">
+            <a:normAutofit/>
+          </a:bodyPr>
           <a:lstStyle>
-            <a:lvl1pPr>
-              <a:defRPr sz="6000"/>
+            <a:lvl1pPr algn="r">
+              <a:defRPr sz="4000"/>
             </a:lvl1pPr>
           </a:lstStyle>
           <a:p>
@@ -1298,18 +4005,22 @@
         </p:nvSpPr>
         <p:spPr>
           <a:xfrm>
-            <a:off x="623888" y="4589464"/>
-            <a:ext cx="7886700" cy="1500187"/>
-          </a:xfrm>
-        </p:spPr>
-        <p:txBody>
-          <a:bodyPr/>
+            <a:off x="594360" y="3641726"/>
+            <a:ext cx="7955281" cy="1354134"/>
+          </a:xfrm>
+        </p:spPr>
+        <p:txBody>
+          <a:bodyPr>
+            <a:normAutofit/>
+          </a:bodyPr>
           <a:lstStyle>
-            <a:lvl1pPr marL="0" indent="0">
-              <a:buNone/>
-              <a:defRPr sz="2400">
+            <a:lvl1pPr marL="0" indent="0" algn="r">
+              <a:buNone/>
+              <a:defRPr sz="2200">
                 <a:solidFill>
-                  <a:schemeClr val="tx1"/>
+                  <a:schemeClr val="tx1">
+                    <a:tint val="75000"/>
+                  </a:schemeClr>
                 </a:solidFill>
               </a:defRPr>
             </a:lvl1pPr>
@@ -1413,10 +4124,19 @@
             <p:ph type="dt" sz="half" idx="10"/>
           </p:nvPr>
         </p:nvSpPr>
-        <p:spPr/>
-        <p:txBody>
-          <a:bodyPr/>
-          <a:lstStyle/>
+        <p:spPr>
+          <a:xfrm>
+            <a:off x="5562176" y="381001"/>
+            <a:ext cx="2183130" cy="365125"/>
+          </a:xfrm>
+        </p:spPr>
+        <p:txBody>
+          <a:bodyPr/>
+          <a:lstStyle>
+            <a:lvl1pPr algn="r">
+              <a:defRPr/>
+            </a:lvl1pPr>
+          </a:lstStyle>
           <a:p>
             <a:fld id="{C12D3BD2-B232-5E48-BF4C-8373DF233EA7}" type="datetime1">
               <a:rPr kumimoji="1" lang="zh-CN" altLang="en-US" smtClean="0"/>
@@ -1436,7 +4156,12 @@
             <p:ph type="ftr" sz="quarter" idx="11"/>
           </p:nvPr>
         </p:nvSpPr>
-        <p:spPr/>
+        <p:spPr>
+          <a:xfrm>
+            <a:off x="594360" y="381001"/>
+            <a:ext cx="4830656" cy="365125"/>
+          </a:xfrm>
+        </p:spPr>
         <p:txBody>
           <a:bodyPr/>
           <a:lstStyle/>
@@ -1455,7 +4180,12 @@
             <p:ph type="sldNum" sz="quarter" idx="12"/>
           </p:nvPr>
         </p:nvSpPr>
-        <p:spPr/>
+        <p:spPr>
+          <a:xfrm>
+            <a:off x="7882466" y="381001"/>
+            <a:ext cx="667173" cy="365125"/>
+          </a:xfrm>
+        </p:spPr>
         <p:txBody>
           <a:bodyPr/>
           <a:lstStyle/>
@@ -1528,8 +4258,8 @@
         </p:nvSpPr>
         <p:spPr>
           <a:xfrm>
-            <a:off x="628650" y="1825625"/>
-            <a:ext cx="3886200" cy="4351338"/>
+            <a:off x="594360" y="2194560"/>
+            <a:ext cx="3910579" cy="4069080"/>
           </a:xfrm>
         </p:spPr>
         <p:txBody>
@@ -1585,8 +4315,8 @@
         </p:nvSpPr>
         <p:spPr>
           <a:xfrm>
-            <a:off x="4629150" y="1825625"/>
-            <a:ext cx="3886200" cy="4351338"/>
+            <a:off x="4642099" y="2194560"/>
+            <a:ext cx="3907540" cy="4069080"/>
           </a:xfrm>
         </p:spPr>
         <p:txBody>
@@ -1700,6 +4430,11 @@
   <p:clrMapOvr>
     <a:masterClrMapping/>
   </p:clrMapOvr>
+  <p:extLst>
+    <p:ext uri="{DCECCB84-F9BA-43D5-87BE-67443E8EF086}">
+      <p15:sldGuideLst xmlns:p15="http://schemas.microsoft.com/office/powerpoint/2012/main"/>
+    </p:ext>
+  </p:extLst>
 </p:sldLayout>
 </file>
 
@@ -1732,8 +4467,8 @@
         </p:nvSpPr>
         <p:spPr>
           <a:xfrm>
-            <a:off x="629841" y="365126"/>
-            <a:ext cx="7886700" cy="1325563"/>
+            <a:off x="2171700" y="762000"/>
+            <a:ext cx="6377940" cy="1295400"/>
           </a:xfrm>
         </p:spPr>
         <p:txBody>
@@ -1760,16 +4495,22 @@
         </p:nvSpPr>
         <p:spPr>
           <a:xfrm>
-            <a:off x="629842" y="1681163"/>
-            <a:ext cx="3868340" cy="823912"/>
-          </a:xfrm>
-        </p:spPr>
-        <p:txBody>
-          <a:bodyPr anchor="b"/>
+            <a:off x="821279" y="2183802"/>
+            <a:ext cx="3683659" cy="823912"/>
+          </a:xfrm>
+        </p:spPr>
+        <p:txBody>
+          <a:bodyPr anchor="b">
+            <a:normAutofit/>
+          </a:bodyPr>
           <a:lstStyle>
             <a:lvl1pPr marL="0" indent="0">
               <a:buNone/>
-              <a:defRPr sz="2400" b="1"/>
+              <a:defRPr sz="2800" b="0">
+                <a:solidFill>
+                  <a:schemeClr val="tx1"/>
+                </a:solidFill>
+              </a:defRPr>
             </a:lvl1pPr>
             <a:lvl2pPr marL="457200" indent="0">
               <a:buNone/>
@@ -1825,8 +4566,8 @@
         </p:nvSpPr>
         <p:spPr>
           <a:xfrm>
-            <a:off x="629842" y="2505075"/>
-            <a:ext cx="3868340" cy="3684588"/>
+            <a:off x="594359" y="3132667"/>
+            <a:ext cx="3910579" cy="3130973"/>
           </a:xfrm>
         </p:spPr>
         <p:txBody>
@@ -1882,16 +4623,22 @@
         </p:nvSpPr>
         <p:spPr>
           <a:xfrm>
-            <a:off x="4629150" y="1681163"/>
-            <a:ext cx="3887391" cy="823912"/>
-          </a:xfrm>
-        </p:spPr>
-        <p:txBody>
-          <a:bodyPr anchor="b"/>
+            <a:off x="4869018" y="2183802"/>
+            <a:ext cx="3680621" cy="823912"/>
+          </a:xfrm>
+        </p:spPr>
+        <p:txBody>
+          <a:bodyPr anchor="b">
+            <a:normAutofit/>
+          </a:bodyPr>
           <a:lstStyle>
             <a:lvl1pPr marL="0" indent="0">
               <a:buNone/>
-              <a:defRPr sz="2400" b="1"/>
+              <a:defRPr sz="2800" b="0">
+                <a:solidFill>
+                  <a:schemeClr val="tx1"/>
+                </a:solidFill>
+              </a:defRPr>
             </a:lvl1pPr>
             <a:lvl2pPr marL="457200" indent="0">
               <a:buNone/>
@@ -1947,8 +4694,8 @@
         </p:nvSpPr>
         <p:spPr>
           <a:xfrm>
-            <a:off x="4629150" y="2505075"/>
-            <a:ext cx="3887391" cy="3684588"/>
+            <a:off x="4642098" y="3132667"/>
+            <a:ext cx="3907541" cy="3130973"/>
           </a:xfrm>
         </p:spPr>
         <p:txBody>
@@ -2062,6 +4809,11 @@
   <p:clrMapOvr>
     <a:masterClrMapping/>
   </p:clrMapOvr>
+  <p:extLst>
+    <p:ext uri="{DCECCB84-F9BA-43D5-87BE-67443E8EF086}">
+      <p15:sldGuideLst xmlns:p15="http://schemas.microsoft.com/office/powerpoint/2012/main"/>
+    </p:ext>
+  </p:extLst>
 </p:sldLayout>
 </file>
 
@@ -2297,14 +5049,14 @@
         </p:nvSpPr>
         <p:spPr>
           <a:xfrm>
-            <a:off x="629841" y="457200"/>
-            <a:ext cx="2949178" cy="1600200"/>
+            <a:off x="594360" y="1524000"/>
+            <a:ext cx="3086100" cy="1600200"/>
           </a:xfrm>
         </p:spPr>
         <p:txBody>
           <a:bodyPr anchor="b"/>
           <a:lstStyle>
-            <a:lvl1pPr>
+            <a:lvl1pPr algn="l">
               <a:defRPr sz="3200"/>
             </a:lvl1pPr>
           </a:lstStyle>
@@ -2329,41 +5081,13 @@
         </p:nvSpPr>
         <p:spPr>
           <a:xfrm>
-            <a:off x="3887391" y="987426"/>
-            <a:ext cx="4629150" cy="4873625"/>
-          </a:xfrm>
-        </p:spPr>
-        <p:txBody>
-          <a:bodyPr/>
-          <a:lstStyle>
-            <a:lvl1pPr>
-              <a:defRPr sz="3200"/>
-            </a:lvl1pPr>
-            <a:lvl2pPr>
-              <a:defRPr sz="2800"/>
-            </a:lvl2pPr>
-            <a:lvl3pPr>
-              <a:defRPr sz="2400"/>
-            </a:lvl3pPr>
-            <a:lvl4pPr>
-              <a:defRPr sz="2000"/>
-            </a:lvl4pPr>
-            <a:lvl5pPr>
-              <a:defRPr sz="2000"/>
-            </a:lvl5pPr>
-            <a:lvl6pPr>
-              <a:defRPr sz="2000"/>
-            </a:lvl6pPr>
-            <a:lvl7pPr>
-              <a:defRPr sz="2000"/>
-            </a:lvl7pPr>
-            <a:lvl8pPr>
-              <a:defRPr sz="2000"/>
-            </a:lvl8pPr>
-            <a:lvl9pPr>
-              <a:defRPr sz="2000"/>
-            </a:lvl9pPr>
-          </a:lstStyle>
+            <a:off x="3886200" y="746760"/>
+            <a:ext cx="4663440" cy="5516880"/>
+          </a:xfrm>
+        </p:spPr>
+        <p:txBody>
+          <a:bodyPr anchor="ctr"/>
+          <a:lstStyle/>
           <a:p>
             <a:pPr lvl="0"/>
             <a:r>
@@ -2414,8 +5138,8 @@
         </p:nvSpPr>
         <p:spPr>
           <a:xfrm>
-            <a:off x="629841" y="2057400"/>
-            <a:ext cx="2949178" cy="3811588"/>
+            <a:off x="594360" y="3124200"/>
+            <a:ext cx="3086100" cy="3139440"/>
           </a:xfrm>
         </p:spPr>
         <p:txBody>
@@ -2537,6 +5261,11 @@
   <p:clrMapOvr>
     <a:masterClrMapping/>
   </p:clrMapOvr>
+  <p:extLst>
+    <p:ext uri="{DCECCB84-F9BA-43D5-87BE-67443E8EF086}">
+      <p15:sldGuideLst xmlns:p15="http://schemas.microsoft.com/office/powerpoint/2012/main"/>
+    </p:ext>
+  </p:extLst>
 </p:sldLayout>
 </file>
 
@@ -2569,14 +5298,14 @@
         </p:nvSpPr>
         <p:spPr>
           <a:xfrm>
-            <a:off x="629841" y="457200"/>
-            <a:ext cx="2949178" cy="1600200"/>
+            <a:off x="594360" y="1524000"/>
+            <a:ext cx="4075730" cy="1600200"/>
           </a:xfrm>
         </p:spPr>
         <p:txBody>
           <a:bodyPr anchor="b"/>
           <a:lstStyle>
-            <a:lvl1pPr>
+            <a:lvl1pPr algn="l">
               <a:defRPr sz="3200"/>
             </a:lvl1pPr>
           </a:lstStyle>
@@ -2601,8 +5330,8 @@
         </p:nvSpPr>
         <p:spPr>
           <a:xfrm>
-            <a:off x="3887391" y="987426"/>
-            <a:ext cx="4629150" cy="4873625"/>
+            <a:off x="4877524" y="751242"/>
+            <a:ext cx="3674234" cy="5512398"/>
           </a:xfrm>
         </p:spPr>
         <p:txBody>
@@ -2666,8 +5395,8 @@
         </p:nvSpPr>
         <p:spPr>
           <a:xfrm>
-            <a:off x="629841" y="2057400"/>
-            <a:ext cx="2949178" cy="3811588"/>
+            <a:off x="594360" y="3124200"/>
+            <a:ext cx="4075730" cy="3139440"/>
           </a:xfrm>
         </p:spPr>
         <p:txBody>
@@ -2757,7 +5486,12 @@
           <a:bodyPr/>
           <a:lstStyle/>
           <a:p>
-            <a:endParaRPr kumimoji="1" lang="zh-CN" altLang="en-US"/>
+            <a:r>
+              <a:rPr lang="en-US" smtClean="0"/>
+              <a:t>
+              </a:t>
+            </a:r>
+            <a:endParaRPr lang="en-US" dirty="0"/>
           </a:p>
         </p:txBody>
       </p:sp>
@@ -2814,25 +5548,55 @@
           <a:chExt cx="0" cy="0"/>
         </a:xfrm>
       </p:grpSpPr>
-      <p:sp>
-        <p:nvSpPr>
-          <p:cNvPr id="2" name="Title Placeholder 1"/>
-          <p:cNvSpPr>
-            <a:spLocks noGrp="1"/>
-          </p:cNvSpPr>
-          <p:nvPr>
-            <p:ph type="title"/>
-          </p:nvPr>
-        </p:nvSpPr>
-        <p:spPr>
-          <a:xfrm>
-            <a:off x="628650" y="365126"/>
-            <a:ext cx="7886700" cy="1325563"/>
+      <p:pic>
+        <p:nvPicPr>
+          <p:cNvPr id="7" name="Picture 6" descr="C0-HD-TOP.png"/>
+          <p:cNvPicPr>
+            <a:picLocks noChangeAspect="1"/>
+          </p:cNvPicPr>
+          <p:nvPr/>
+        </p:nvPicPr>
+        <p:blipFill>
+          <a:blip r:embed="rId19">
+            <a:extLst>
+              <a:ext uri="{28A0092B-C50C-407E-A947-70E740481C1C}">
+                <a14:useLocalDpi xmlns:a14="http://schemas.microsoft.com/office/drawing/2010/main" val="0"/>
+              </a:ext>
+            </a:extLst>
+          </a:blip>
+          <a:stretch>
+            <a:fillRect/>
+          </a:stretch>
+        </p:blipFill>
+        <p:spPr>
+          <a:xfrm>
+            <a:off x="0" y="0"/>
+            <a:ext cx="9144000" cy="1081088"/>
           </a:xfrm>
           <a:prstGeom prst="rect">
             <a:avLst/>
           </a:prstGeom>
         </p:spPr>
+      </p:pic>
+      <p:sp>
+        <p:nvSpPr>
+          <p:cNvPr id="2" name="Title Placeholder 1"/>
+          <p:cNvSpPr>
+            <a:spLocks noGrp="1"/>
+          </p:cNvSpPr>
+          <p:nvPr>
+            <p:ph type="title"/>
+          </p:nvPr>
+        </p:nvSpPr>
+        <p:spPr>
+          <a:xfrm>
+            <a:off x="2171700" y="764373"/>
+            <a:ext cx="6377940" cy="1293028"/>
+          </a:xfrm>
+          <a:prstGeom prst="rect">
+            <a:avLst/>
+          </a:prstGeom>
+        </p:spPr>
         <p:txBody>
           <a:bodyPr vert="horz" lIns="91440" tIns="45720" rIns="91440" bIns="45720" rtlCol="0" anchor="ctr">
             <a:normAutofit/>
@@ -2859,8 +5623,8 @@
         </p:nvSpPr>
         <p:spPr>
           <a:xfrm>
-            <a:off x="628650" y="1825625"/>
-            <a:ext cx="7886700" cy="4351338"/>
+            <a:off x="594360" y="2194560"/>
+            <a:ext cx="7955280" cy="4069080"/>
           </a:xfrm>
           <a:prstGeom prst="rect">
             <a:avLst/>
@@ -2921,8 +5685,8 @@
         </p:nvSpPr>
         <p:spPr>
           <a:xfrm>
-            <a:off x="628650" y="6356351"/>
-            <a:ext cx="2057400" cy="365125"/>
+            <a:off x="6412230" y="6356351"/>
+            <a:ext cx="2137410" cy="365125"/>
           </a:xfrm>
           <a:prstGeom prst="rect">
             <a:avLst/>
@@ -2931,8 +5695,8 @@
         <p:txBody>
           <a:bodyPr vert="horz" lIns="91440" tIns="45720" rIns="91440" bIns="45720" rtlCol="0" anchor="ctr"/>
           <a:lstStyle>
-            <a:lvl1pPr algn="l">
-              <a:defRPr sz="1200">
+            <a:lvl1pPr algn="r">
+              <a:defRPr sz="1050">
                 <a:solidFill>
                   <a:schemeClr val="tx1">
                     <a:tint val="75000"/>
@@ -2962,8 +5726,8 @@
         </p:nvSpPr>
         <p:spPr>
           <a:xfrm>
-            <a:off x="3028950" y="6356351"/>
-            <a:ext cx="3086100" cy="365125"/>
+            <a:off x="594360" y="6355846"/>
+            <a:ext cx="5680710" cy="365125"/>
           </a:xfrm>
           <a:prstGeom prst="rect">
             <a:avLst/>
@@ -2972,8 +5736,8 @@
         <p:txBody>
           <a:bodyPr vert="horz" lIns="91440" tIns="45720" rIns="91440" bIns="45720" rtlCol="0" anchor="ctr"/>
           <a:lstStyle>
-            <a:lvl1pPr algn="ctr">
-              <a:defRPr sz="1200">
+            <a:lvl1pPr algn="l">
+              <a:defRPr sz="1050">
                 <a:solidFill>
                   <a:schemeClr val="tx1">
                     <a:tint val="75000"/>
@@ -2999,8 +5763,8 @@
         </p:nvSpPr>
         <p:spPr>
           <a:xfrm>
-            <a:off x="6457950" y="6356351"/>
-            <a:ext cx="2057400" cy="365125"/>
+            <a:off x="6572250" y="381001"/>
+            <a:ext cx="1977390" cy="365125"/>
           </a:xfrm>
           <a:prstGeom prst="rect">
             <a:avLst/>
@@ -3010,7 +5774,7 @@
           <a:bodyPr vert="horz" lIns="91440" tIns="45720" rIns="91440" bIns="45720" rtlCol="0" anchor="ctr"/>
           <a:lstStyle>
             <a:lvl1pPr algn="r">
-              <a:defRPr sz="1200">
+              <a:defRPr sz="1050">
                 <a:solidFill>
                   <a:schemeClr val="tx1">
                     <a:tint val="75000"/>
@@ -3031,28 +5795,34 @@
     </p:spTree>
     <p:extLst>
       <p:ext uri="{BB962C8B-B14F-4D97-AF65-F5344CB8AC3E}">
-        <p14:creationId xmlns:p14="http://schemas.microsoft.com/office/powerpoint/2010/main" val="1106662445"/>
+        <p14:creationId xmlns:p14="http://schemas.microsoft.com/office/powerpoint/2010/main" val="1518180590"/>
       </p:ext>
     </p:extLst>
   </p:cSld>
-  <p:clrMap bg1="lt1" tx1="dk1" bg2="lt2" tx2="dk2" accent1="accent1" accent2="accent2" accent3="accent3" accent4="accent4" accent5="accent5" accent6="accent6" hlink="hlink" folHlink="folHlink"/>
+  <p:clrMap bg1="dk1" tx1="lt1" bg2="dk2" tx2="lt2" accent1="accent1" accent2="accent2" accent3="accent3" accent4="accent4" accent5="accent5" accent6="accent6" hlink="hlink" folHlink="folHlink"/>
   <p:sldLayoutIdLst>
-    <p:sldLayoutId id="2147483661" r:id="rId1"/>
-    <p:sldLayoutId id="2147483662" r:id="rId2"/>
-    <p:sldLayoutId id="2147483663" r:id="rId3"/>
-    <p:sldLayoutId id="2147483664" r:id="rId4"/>
-    <p:sldLayoutId id="2147483665" r:id="rId5"/>
-    <p:sldLayoutId id="2147483666" r:id="rId6"/>
-    <p:sldLayoutId id="2147483667" r:id="rId7"/>
-    <p:sldLayoutId id="2147483668" r:id="rId8"/>
-    <p:sldLayoutId id="2147483669" r:id="rId9"/>
-    <p:sldLayoutId id="2147483670" r:id="rId10"/>
-    <p:sldLayoutId id="2147483671" r:id="rId11"/>
+    <p:sldLayoutId id="2147483882" r:id="rId1"/>
+    <p:sldLayoutId id="2147483883" r:id="rId2"/>
+    <p:sldLayoutId id="2147483884" r:id="rId3"/>
+    <p:sldLayoutId id="2147483885" r:id="rId4"/>
+    <p:sldLayoutId id="2147483886" r:id="rId5"/>
+    <p:sldLayoutId id="2147483887" r:id="rId6"/>
+    <p:sldLayoutId id="2147483888" r:id="rId7"/>
+    <p:sldLayoutId id="2147483889" r:id="rId8"/>
+    <p:sldLayoutId id="2147483890" r:id="rId9"/>
+    <p:sldLayoutId id="2147483891" r:id="rId10"/>
+    <p:sldLayoutId id="2147483892" r:id="rId11"/>
+    <p:sldLayoutId id="2147483893" r:id="rId12"/>
+    <p:sldLayoutId id="2147483894" r:id="rId13"/>
+    <p:sldLayoutId id="2147483895" r:id="rId14"/>
+    <p:sldLayoutId id="2147483896" r:id="rId15"/>
+    <p:sldLayoutId id="2147483897" r:id="rId16"/>
+    <p:sldLayoutId id="2147483898" r:id="rId17"/>
   </p:sldLayoutIdLst>
   <p:hf hdr="0" ftr="0"/>
   <p:txStyles>
     <p:titleStyle>
-      <a:lvl1pPr algn="l" defTabSz="914400" rtl="0" eaLnBrk="1" latinLnBrk="0" hangingPunct="1">
+      <a:lvl1pPr algn="r" defTabSz="914400" rtl="0" eaLnBrk="1" latinLnBrk="0" hangingPunct="1">
         <a:lnSpc>
           <a:spcPct val="90000"/>
         </a:lnSpc>
@@ -3060,7 +5830,7 @@
           <a:spcPct val="0"/>
         </a:spcBef>
         <a:buNone/>
-        <a:defRPr sz="4400" kern="1200">
+        <a:defRPr sz="4000" kern="1200" cap="all" baseline="0">
           <a:solidFill>
             <a:schemeClr val="tx1"/>
           </a:solidFill>
@@ -3080,7 +5850,7 @@
         </a:spcBef>
         <a:buFont typeface="Arial" panose="020B0604020202020204" pitchFamily="34" charset="0"/>
         <a:buChar char="•"/>
-        <a:defRPr sz="2800" kern="1200">
+        <a:defRPr sz="2200" kern="1200">
           <a:solidFill>
             <a:schemeClr val="tx1"/>
           </a:solidFill>
@@ -3098,7 +5868,7 @@
         </a:spcBef>
         <a:buFont typeface="Arial" panose="020B0604020202020204" pitchFamily="34" charset="0"/>
         <a:buChar char="•"/>
-        <a:defRPr sz="2400" kern="1200">
+        <a:defRPr sz="2000" kern="1200">
           <a:solidFill>
             <a:schemeClr val="tx1"/>
           </a:solidFill>
@@ -3116,7 +5886,7 @@
         </a:spcBef>
         <a:buFont typeface="Arial" panose="020B0604020202020204" pitchFamily="34" charset="0"/>
         <a:buChar char="•"/>
-        <a:defRPr sz="2000" kern="1200">
+        <a:defRPr sz="1800" kern="1200">
           <a:solidFill>
             <a:schemeClr val="tx1"/>
           </a:solidFill>
@@ -3134,7 +5904,7 @@
         </a:spcBef>
         <a:buFont typeface="Arial" panose="020B0604020202020204" pitchFamily="34" charset="0"/>
         <a:buChar char="•"/>
-        <a:defRPr sz="1800" kern="1200">
+        <a:defRPr sz="1600" kern="1200">
           <a:solidFill>
             <a:schemeClr val="tx1"/>
           </a:solidFill>
@@ -3152,7 +5922,7 @@
         </a:spcBef>
         <a:buFont typeface="Arial" panose="020B0604020202020204" pitchFamily="34" charset="0"/>
         <a:buChar char="•"/>
-        <a:defRPr sz="1800" kern="1200">
+        <a:defRPr sz="1600" kern="1200">
           <a:solidFill>
             <a:schemeClr val="tx1"/>
           </a:solidFill>
@@ -3170,7 +5940,7 @@
         </a:spcBef>
         <a:buFont typeface="Arial" panose="020B0604020202020204" pitchFamily="34" charset="0"/>
         <a:buChar char="•"/>
-        <a:defRPr sz="1800" kern="1200">
+        <a:defRPr sz="1600" kern="1200">
           <a:solidFill>
             <a:schemeClr val="tx1"/>
           </a:solidFill>
@@ -3188,7 +5958,7 @@
         </a:spcBef>
         <a:buFont typeface="Arial" panose="020B0604020202020204" pitchFamily="34" charset="0"/>
         <a:buChar char="•"/>
-        <a:defRPr sz="1800" kern="1200">
+        <a:defRPr sz="1600" kern="1200">
           <a:solidFill>
             <a:schemeClr val="tx1"/>
           </a:solidFill>
@@ -3206,7 +5976,7 @@
         </a:spcBef>
         <a:buFont typeface="Arial" panose="020B0604020202020204" pitchFamily="34" charset="0"/>
         <a:buChar char="•"/>
-        <a:defRPr sz="1800" kern="1200">
+        <a:defRPr sz="1600" kern="1200">
           <a:solidFill>
             <a:schemeClr val="tx1"/>
           </a:solidFill>
@@ -3224,7 +5994,7 @@
         </a:spcBef>
         <a:buFont typeface="Arial" panose="020B0604020202020204" pitchFamily="34" charset="0"/>
         <a:buChar char="•"/>
-        <a:defRPr sz="1800" kern="1200">
+        <a:defRPr sz="1600" kern="1200">
           <a:solidFill>
             <a:schemeClr val="tx1"/>
           </a:solidFill>
@@ -3330,6 +6100,11 @@
       </a:lvl9pPr>
     </p:otherStyle>
   </p:txStyles>
+  <p:extLst>
+    <p:ext uri="{27BBF7A9-308A-43DC-89C8-2F10F3537804}">
+      <p15:sldGuideLst xmlns:p15="http://schemas.microsoft.com/office/powerpoint/2012/main"/>
+    </p:ext>
+  </p:extLst>
 </p:sldMaster>
 </file>
 
@@ -3367,14 +6142,11 @@
           <a:p>
             <a:r>
               <a:rPr kumimoji="1" lang="en-US" altLang="zh-CN" dirty="0" smtClean="0"/>
-              <a:t>Introduction to</a:t>
-            </a:r>
-            <a:br>
-              <a:rPr kumimoji="1" lang="en-US" altLang="zh-CN" dirty="0" smtClean="0"/>
-            </a:br>
-            <a:r>
-              <a:rPr kumimoji="1" lang="en-US" altLang="zh-CN" dirty="0" smtClean="0"/>
-              <a:t>Python Programming</a:t>
+              <a:t>Python</a:t>
+            </a:r>
+            <a:r>
+              <a:rPr kumimoji="1" lang="zh-CN" altLang="en-US" dirty="0" smtClean="0"/>
+              <a:t>编程入门</a:t>
             </a:r>
             <a:endParaRPr kumimoji="1" lang="zh-CN" altLang="en-US" dirty="0"/>
           </a:p>
@@ -3390,20 +6162,27 @@
             <p:ph type="subTitle" idx="1"/>
           </p:nvPr>
         </p:nvSpPr>
-        <p:spPr/>
-        <p:txBody>
-          <a:bodyPr/>
-          <a:lstStyle/>
-          <a:p>
-            <a:r>
-              <a:rPr kumimoji="1" lang="en-US" altLang="zh-CN" dirty="0" smtClean="0"/>
+        <p:spPr>
+          <a:xfrm>
+            <a:off x="1143000" y="4327595"/>
+            <a:ext cx="6858000" cy="1655762"/>
+          </a:xfrm>
+        </p:spPr>
+        <p:txBody>
+          <a:bodyPr>
+            <a:normAutofit/>
+          </a:bodyPr>
+          <a:lstStyle/>
+          <a:p>
+            <a:r>
+              <a:rPr kumimoji="1" lang="en-US" altLang="zh-CN" sz="4800" dirty="0" smtClean="0"/>
               <a:t>Min </a:t>
             </a:r>
             <a:r>
-              <a:rPr kumimoji="1" lang="en-US" altLang="zh-CN" dirty="0" err="1" smtClean="0"/>
+              <a:rPr kumimoji="1" lang="en-US" altLang="zh-CN" sz="4800" dirty="0" err="1" smtClean="0"/>
               <a:t>Cai</a:t>
             </a:r>
-            <a:endParaRPr kumimoji="1" lang="zh-CN" altLang="en-US" dirty="0"/>
+            <a:endParaRPr kumimoji="1" lang="zh-CN" altLang="en-US" sz="4800" dirty="0"/>
           </a:p>
         </p:txBody>
       </p:sp>
@@ -3639,9 +6418,9 @@
 </file>
 
 <file path=ppt/theme/theme1.xml><?xml version="1.0" encoding="utf-8"?>
-<a:theme xmlns:a="http://schemas.openxmlformats.org/drawingml/2006/main" name="Office 主题">
+<a:theme xmlns:a="http://schemas.openxmlformats.org/drawingml/2006/main" name="水汽尾迹">
   <a:themeElements>
-    <a:clrScheme name="Office 主题">
+    <a:clrScheme name="水汽尾迹">
       <a:dk1>
         <a:sysClr val="windowText" lastClr="000000"/>
       </a:dk1>
@@ -3649,44 +6428,44 @@
         <a:sysClr val="window" lastClr="FFFFFF"/>
       </a:lt1>
       <a:dk2>
-        <a:srgbClr val="44546A"/>
+        <a:srgbClr val="454545"/>
       </a:dk2>
       <a:lt2>
-        <a:srgbClr val="E7E6E6"/>
+        <a:srgbClr val="DADADA"/>
       </a:lt2>
       <a:accent1>
-        <a:srgbClr val="4472C4"/>
+        <a:srgbClr val="DF2E28"/>
       </a:accent1>
       <a:accent2>
-        <a:srgbClr val="ED7D31"/>
+        <a:srgbClr val="FE801A"/>
       </a:accent2>
       <a:accent3>
-        <a:srgbClr val="A5A5A5"/>
+        <a:srgbClr val="E9BF35"/>
       </a:accent3>
       <a:accent4>
-        <a:srgbClr val="FFC000"/>
+        <a:srgbClr val="81BB42"/>
       </a:accent4>
       <a:accent5>
-        <a:srgbClr val="5B9BD5"/>
+        <a:srgbClr val="32C7A9"/>
       </a:accent5>
       <a:accent6>
-        <a:srgbClr val="70AD47"/>
+        <a:srgbClr val="4A9BDC"/>
       </a:accent6>
       <a:hlink>
-        <a:srgbClr val="0563C1"/>
+        <a:srgbClr val="F0532B"/>
       </a:hlink>
       <a:folHlink>
-        <a:srgbClr val="954F72"/>
+        <a:srgbClr val="F38B53"/>
       </a:folHlink>
     </a:clrScheme>
-    <a:fontScheme name="Office 主题">
+    <a:fontScheme name="水汽尾迹">
       <a:majorFont>
-        <a:latin typeface="Calibri Light" panose="020F0302020204030204"/>
+        <a:latin typeface="Century Gothic" panose="020B0502020202020204"/>
         <a:ea typeface=""/>
         <a:cs typeface=""/>
-        <a:font script="Jpan" typeface="游ゴシック Light"/>
+        <a:font script="Jpan" typeface="ＭＳ Ｐゴシック"/>
         <a:font script="Hang" typeface="맑은 고딕"/>
-        <a:font script="Hans" typeface="等线 Light"/>
+        <a:font script="Hans" typeface="宋体"/>
         <a:font script="Hant" typeface="新細明體"/>
         <a:font script="Arab" typeface="Times New Roman"/>
         <a:font script="Hebr" typeface="Times New Roman"/>
@@ -3716,12 +6495,12 @@
         <a:font script="Geor" typeface="Sylfaen"/>
       </a:majorFont>
       <a:minorFont>
-        <a:latin typeface="Calibri" panose="020F0502020204030204"/>
+        <a:latin typeface="Century Gothic" panose="020B0502020202020204"/>
         <a:ea typeface=""/>
         <a:cs typeface=""/>
-        <a:font script="Jpan" typeface="游ゴシック"/>
+        <a:font script="Jpan" typeface="ＭＳ Ｐゴシック"/>
         <a:font script="Hang" typeface="맑은 고딕"/>
-        <a:font script="Hans" typeface="等线"/>
+        <a:font script="Hans" typeface="宋体"/>
         <a:font script="Hant" typeface="新細明體"/>
         <a:font script="Arab" typeface="Arial"/>
         <a:font script="Hebr" typeface="Arial"/>
@@ -3751,7 +6530,7 @@
         <a:font script="Geor" typeface="Sylfaen"/>
       </a:minorFont>
     </a:fontScheme>
-    <a:fmtScheme name="Office 主题">
+    <a:fmtScheme name="水汽尾迹">
       <a:fillStyleLst>
         <a:solidFill>
           <a:schemeClr val="phClr"/>
@@ -3760,23 +6539,24 @@
           <a:gsLst>
             <a:gs pos="0">
               <a:schemeClr val="phClr">
+                <a:tint val="69000"/>
+                <a:alpha val="100000"/>
+                <a:satMod val="109000"/>
                 <a:lumMod val="110000"/>
-                <a:satMod val="105000"/>
-                <a:tint val="67000"/>
               </a:schemeClr>
             </a:gs>
-            <a:gs pos="50000">
+            <a:gs pos="52000">
               <a:schemeClr val="phClr">
-                <a:lumMod val="105000"/>
-                <a:satMod val="103000"/>
-                <a:tint val="73000"/>
+                <a:tint val="74000"/>
+                <a:satMod val="100000"/>
+                <a:lumMod val="104000"/>
               </a:schemeClr>
             </a:gs>
             <a:gs pos="100000">
               <a:schemeClr val="phClr">
-                <a:lumMod val="105000"/>
-                <a:satMod val="109000"/>
-                <a:tint val="81000"/>
+                <a:tint val="78000"/>
+                <a:satMod val="100000"/>
+                <a:lumMod val="100000"/>
               </a:schemeClr>
             </a:gs>
           </a:gsLst>
@@ -3786,23 +6566,16 @@
           <a:gsLst>
             <a:gs pos="0">
               <a:schemeClr val="phClr">
-                <a:satMod val="103000"/>
-                <a:lumMod val="102000"/>
-                <a:tint val="94000"/>
+                <a:tint val="96000"/>
+                <a:satMod val="100000"/>
+                <a:lumMod val="104000"/>
               </a:schemeClr>
             </a:gs>
-            <a:gs pos="50000">
+            <a:gs pos="78000">
               <a:schemeClr val="phClr">
+                <a:shade val="100000"/>
                 <a:satMod val="110000"/>
                 <a:lumMod val="100000"/>
-                <a:shade val="100000"/>
-              </a:schemeClr>
-            </a:gs>
-            <a:gs pos="100000">
-              <a:schemeClr val="phClr">
-                <a:lumMod val="99000"/>
-                <a:satMod val="120000"/>
-                <a:shade val="78000"/>
               </a:schemeClr>
             </a:gs>
           </a:gsLst>
@@ -3810,26 +6583,23 @@
         </a:gradFill>
       </a:fillStyleLst>
       <a:lnStyleLst>
-        <a:ln w="6350" cap="flat" cmpd="sng" algn="ctr">
+        <a:ln w="9525" cap="flat" cmpd="sng" algn="ctr">
           <a:solidFill>
             <a:schemeClr val="phClr"/>
           </a:solidFill>
           <a:prstDash val="solid"/>
-          <a:miter lim="800000"/>
         </a:ln>
         <a:ln w="12700" cap="flat" cmpd="sng" algn="ctr">
           <a:solidFill>
             <a:schemeClr val="phClr"/>
           </a:solidFill>
           <a:prstDash val="solid"/>
-          <a:miter lim="800000"/>
         </a:ln>
         <a:ln w="19050" cap="flat" cmpd="sng" algn="ctr">
           <a:solidFill>
             <a:schemeClr val="phClr"/>
           </a:solidFill>
           <a:prstDash val="solid"/>
-          <a:miter lim="800000"/>
         </a:ln>
       </a:lnStyleLst>
       <a:effectStyleLst>
@@ -3838,15 +6608,33 @@
         </a:effectStyle>
         <a:effectStyle>
           <a:effectLst/>
+          <a:scene3d>
+            <a:camera prst="orthographicFront">
+              <a:rot lat="0" lon="0" rev="0"/>
+            </a:camera>
+            <a:lightRig rig="threePt" dir="t"/>
+          </a:scene3d>
+          <a:sp3d>
+            <a:bevelT w="25400" h="12700"/>
+          </a:sp3d>
         </a:effectStyle>
         <a:effectStyle>
           <a:effectLst>
             <a:outerShdw blurRad="57150" dist="19050" dir="5400000" algn="ctr" rotWithShape="0">
               <a:srgbClr val="000000">
-                <a:alpha val="63000"/>
+                <a:alpha val="48000"/>
               </a:srgbClr>
             </a:outerShdw>
           </a:effectLst>
+          <a:scene3d>
+            <a:camera prst="orthographicFront">
+              <a:rot lat="0" lon="0" rev="0"/>
+            </a:camera>
+            <a:lightRig rig="threePt" dir="t"/>
+          </a:scene3d>
+          <a:sp3d>
+            <a:bevelT w="50800" h="25400"/>
+          </a:sp3d>
         </a:effectStyle>
       </a:effectStyleLst>
       <a:bgFillStyleLst>
@@ -3864,16 +6652,16 @@
             <a:gs pos="0">
               <a:schemeClr val="phClr">
                 <a:tint val="93000"/>
+                <a:shade val="98000"/>
                 <a:satMod val="150000"/>
-                <a:shade val="98000"/>
                 <a:lumMod val="102000"/>
               </a:schemeClr>
             </a:gs>
             <a:gs pos="50000">
               <a:schemeClr val="phClr">
                 <a:tint val="98000"/>
+                <a:shade val="90000"/>
                 <a:satMod val="130000"/>
-                <a:shade val="90000"/>
                 <a:lumMod val="103000"/>
               </a:schemeClr>
             </a:gs>
@@ -3893,7 +6681,7 @@
   <a:extraClrSchemeLst/>
   <a:extLst>
     <a:ext uri="{05A4C25C-085E-4340-85A3-A5531E510DB2}">
-      <thm15:themeFamily xmlns:thm15="http://schemas.microsoft.com/office/thememl/2012/main" name="Office Theme" id="{62F939B6-93AF-4DB8-9C6B-D6C7DFDC589F}" vid="{4A3C46E8-61CC-4603-A589-7422A47A8E4A}"/>
+      <thm15:themeFamily xmlns:thm15="http://schemas.microsoft.com/office/thememl/2012/main" name="Vapor Trail" id="{4FDF2955-7D9C-493C-B9F9-C205151B46CD}" vid="{8F31A783-2159-4870-BC29-2BA7D038EA44}"/>
     </a:ext>
   </a:extLst>
 </a:theme>

</xml_diff>